<commit_message>
verslag tekst software design
</commit_message>
<xml_diff>
--- a/SilverSurferVerslag/Verslag demo 4/Klassendiagramma.pptx
+++ b/SilverSurferVerslag/Verslag demo 4/Klassendiagramma.pptx
@@ -3221,11 +3221,11 @@
           <a:p>
             <a:pPr algn="ctr"/>
             <a:r>
-              <a:rPr lang="nl-BE" sz="2400" dirty="0" err="1" smtClean="0">
+              <a:rPr lang="nl-BE" sz="2400" smtClean="0">
                 <a:latin typeface="Times New Roman" pitchFamily="18" charset="0"/>
                 <a:cs typeface="Times New Roman" pitchFamily="18" charset="0"/>
               </a:rPr>
-              <a:t>Viewport</a:t>
+              <a:t>SimulatorViewport</a:t>
             </a:r>
             <a:endParaRPr lang="nl-BE" dirty="0">
               <a:latin typeface="Times New Roman" pitchFamily="18" charset="0"/>
@@ -3680,7 +3680,7 @@
         </p:nvGrpSpPr>
         <p:grpSpPr>
           <a:xfrm>
-            <a:off x="6785150" y="3749586"/>
+            <a:off x="6080548" y="4916579"/>
             <a:ext cx="1735474" cy="937677"/>
             <a:chOff x="6012160" y="4837018"/>
             <a:chExt cx="1735474" cy="937677"/>
@@ -3988,10 +3988,10 @@
         </p:nvGrpSpPr>
         <p:grpSpPr>
           <a:xfrm>
-            <a:off x="1272670" y="619861"/>
-            <a:ext cx="6543352" cy="5256872"/>
-            <a:chOff x="1206720" y="188640"/>
-            <a:chExt cx="6543352" cy="5256872"/>
+            <a:off x="1547664" y="619861"/>
+            <a:ext cx="6268358" cy="5234395"/>
+            <a:chOff x="1481714" y="188640"/>
+            <a:chExt cx="6268358" cy="5234395"/>
           </a:xfrm>
         </p:grpSpPr>
         <p:sp>
@@ -4051,7 +4051,7 @@
           </p:nvSpPr>
           <p:spPr>
             <a:xfrm>
-              <a:off x="4211960" y="3808433"/>
+              <a:off x="3902850" y="3808433"/>
               <a:ext cx="1971352" cy="400110"/>
             </a:xfrm>
             <a:prstGeom prst="rect">
@@ -4098,7 +4098,7 @@
           </p:nvSpPr>
           <p:spPr>
             <a:xfrm>
-              <a:off x="1206720" y="3808433"/>
+              <a:off x="1481714" y="3808433"/>
               <a:ext cx="1971352" cy="400110"/>
             </a:xfrm>
             <a:prstGeom prst="rect">
@@ -4239,7 +4239,7 @@
           </p:nvSpPr>
           <p:spPr>
             <a:xfrm>
-              <a:off x="1206720" y="5045402"/>
+              <a:off x="1481714" y="5022925"/>
               <a:ext cx="1971352" cy="400110"/>
             </a:xfrm>
             <a:prstGeom prst="rect">
@@ -4371,8 +4371,8 @@
           </p:nvCxnSpPr>
           <p:spPr>
             <a:xfrm rot="5400000">
-              <a:off x="2440157" y="2580537"/>
-              <a:ext cx="980135" cy="1475656"/>
+              <a:off x="2577654" y="2718034"/>
+              <a:ext cx="980135" cy="1200662"/>
             </a:xfrm>
             <a:prstGeom prst="bentConnector3">
               <a:avLst/>
@@ -4411,8 +4411,8 @@
           </p:nvCxnSpPr>
           <p:spPr>
             <a:xfrm rot="16200000" flipH="1">
-              <a:off x="3942777" y="2553573"/>
-              <a:ext cx="980135" cy="1529584"/>
+              <a:off x="3788222" y="2708128"/>
+              <a:ext cx="980135" cy="1220474"/>
             </a:xfrm>
             <a:prstGeom prst="bentConnector3">
               <a:avLst/>
@@ -4451,8 +4451,8 @@
           </p:nvCxnSpPr>
           <p:spPr>
             <a:xfrm>
-              <a:off x="2192396" y="4208543"/>
-              <a:ext cx="0" cy="836859"/>
+              <a:off x="2467390" y="4208543"/>
+              <a:ext cx="0" cy="814382"/>
             </a:xfrm>
             <a:prstGeom prst="straightConnector1">
               <a:avLst/>
@@ -4602,7 +4602,7 @@
         </p:nvSpPr>
         <p:spPr>
           <a:xfrm>
-            <a:off x="1551436" y="1779166"/>
+            <a:off x="1691680" y="1779166"/>
             <a:ext cx="2347779" cy="400110"/>
           </a:xfrm>
           <a:prstGeom prst="rect">
@@ -4649,7 +4649,7 @@
         </p:nvSpPr>
         <p:spPr>
           <a:xfrm>
-            <a:off x="1551436" y="3510880"/>
+            <a:off x="1691679" y="3503860"/>
             <a:ext cx="2347780" cy="400110"/>
           </a:xfrm>
           <a:prstGeom prst="rect">
@@ -4695,7 +4695,7 @@
         </p:nvSpPr>
         <p:spPr>
           <a:xfrm>
-            <a:off x="4682247" y="3510880"/>
+            <a:off x="4572000" y="3510880"/>
             <a:ext cx="2338025" cy="400110"/>
           </a:xfrm>
           <a:prstGeom prst="rect">
@@ -4742,7 +4742,7 @@
         </p:nvSpPr>
         <p:spPr>
           <a:xfrm>
-            <a:off x="4682246" y="1779166"/>
+            <a:off x="4572000" y="1779166"/>
             <a:ext cx="2338025" cy="400110"/>
           </a:xfrm>
           <a:prstGeom prst="rect">
@@ -4841,9 +4841,9 @@
           <p:nvPr/>
         </p:nvCxnSpPr>
         <p:spPr>
-          <a:xfrm>
-            <a:off x="2725326" y="2179276"/>
-            <a:ext cx="0" cy="1331604"/>
+          <a:xfrm flipH="1">
+            <a:off x="2865569" y="2179276"/>
+            <a:ext cx="1" cy="1324584"/>
           </a:xfrm>
           <a:prstGeom prst="straightConnector1">
             <a:avLst/>
@@ -4878,9 +4878,9 @@
           <p:nvPr/>
         </p:nvCxnSpPr>
         <p:spPr>
-          <a:xfrm flipH="1" flipV="1">
-            <a:off x="5851259" y="2179276"/>
-            <a:ext cx="1" cy="1331604"/>
+          <a:xfrm flipV="1">
+            <a:off x="5741013" y="2179276"/>
+            <a:ext cx="0" cy="1331604"/>
           </a:xfrm>
           <a:prstGeom prst="straightConnector1">
             <a:avLst/>
@@ -4916,8 +4916,8 @@
         </p:nvCxnSpPr>
         <p:spPr>
           <a:xfrm flipH="1">
-            <a:off x="3899215" y="1979221"/>
-            <a:ext cx="783031" cy="0"/>
+            <a:off x="4039459" y="1979221"/>
+            <a:ext cx="532541" cy="0"/>
           </a:xfrm>
           <a:prstGeom prst="straightConnector1">
             <a:avLst/>
@@ -4953,8 +4953,8 @@
         </p:nvCxnSpPr>
         <p:spPr>
           <a:xfrm>
-            <a:off x="2725326" y="3910990"/>
-            <a:ext cx="1630570" cy="1410544"/>
+            <a:off x="2865569" y="3903970"/>
+            <a:ext cx="1490327" cy="1417564"/>
           </a:xfrm>
           <a:prstGeom prst="straightConnector1">
             <a:avLst/>
@@ -4991,7 +4991,7 @@
         <p:spPr>
           <a:xfrm flipV="1">
             <a:off x="4355896" y="3910990"/>
-            <a:ext cx="1495364" cy="1410544"/>
+            <a:ext cx="1385117" cy="1410544"/>
           </a:xfrm>
           <a:prstGeom prst="straightConnector1">
             <a:avLst/>
@@ -5026,7 +5026,7 @@
         </p:nvSpPr>
         <p:spPr>
           <a:xfrm>
-            <a:off x="1551436" y="692696"/>
+            <a:off x="1691681" y="674192"/>
             <a:ext cx="2347778" cy="400110"/>
           </a:xfrm>
           <a:prstGeom prst="rect">
@@ -5074,8 +5074,8 @@
         </p:nvCxnSpPr>
         <p:spPr>
           <a:xfrm>
-            <a:off x="2725325" y="1092806"/>
-            <a:ext cx="1" cy="686360"/>
+            <a:off x="2865570" y="1074302"/>
+            <a:ext cx="0" cy="704864"/>
           </a:xfrm>
           <a:prstGeom prst="straightConnector1">
             <a:avLst/>
@@ -5108,7 +5108,7 @@
         </p:nvGrpSpPr>
         <p:grpSpPr>
           <a:xfrm>
-            <a:off x="6012160" y="4768403"/>
+            <a:off x="5174551" y="674192"/>
             <a:ext cx="1735474" cy="276999"/>
             <a:chOff x="6110655" y="5044534"/>
             <a:chExt cx="1735474" cy="276999"/>

</xml_diff>

<commit_message>
verslag tekst GUI + RabbitMQ
</commit_message>
<xml_diff>
--- a/SilverSurferVerslag/Verslag demo 4/Klassendiagramma.pptx
+++ b/SilverSurferVerslag/Verslag demo 4/Klassendiagramma.pptx
@@ -8,6 +8,7 @@
     <p:sldId id="256" r:id="rId2"/>
     <p:sldId id="257" r:id="rId3"/>
     <p:sldId id="258" r:id="rId4"/>
+    <p:sldId id="259" r:id="rId5"/>
   </p:sldIdLst>
   <p:sldSz cx="9144000" cy="6858000" type="screen4x3"/>
   <p:notesSz cx="6858000" cy="9144000"/>
@@ -290,7 +291,7 @@
           <a:p>
             <a:fld id="{C9E9C0BE-A832-44F7-BFB7-77E7A556107C}" type="datetimeFigureOut">
               <a:rPr lang="nl-BE" smtClean="0"/>
-              <a:t>26/02/2013</a:t>
+              <a:t>27/02/2013</a:t>
             </a:fld>
             <a:endParaRPr lang="nl-BE"/>
           </a:p>
@@ -460,7 +461,7 @@
           <a:p>
             <a:fld id="{C9E9C0BE-A832-44F7-BFB7-77E7A556107C}" type="datetimeFigureOut">
               <a:rPr lang="nl-BE" smtClean="0"/>
-              <a:t>26/02/2013</a:t>
+              <a:t>27/02/2013</a:t>
             </a:fld>
             <a:endParaRPr lang="nl-BE"/>
           </a:p>
@@ -640,7 +641,7 @@
           <a:p>
             <a:fld id="{C9E9C0BE-A832-44F7-BFB7-77E7A556107C}" type="datetimeFigureOut">
               <a:rPr lang="nl-BE" smtClean="0"/>
-              <a:t>26/02/2013</a:t>
+              <a:t>27/02/2013</a:t>
             </a:fld>
             <a:endParaRPr lang="nl-BE"/>
           </a:p>
@@ -810,7 +811,7 @@
           <a:p>
             <a:fld id="{C9E9C0BE-A832-44F7-BFB7-77E7A556107C}" type="datetimeFigureOut">
               <a:rPr lang="nl-BE" smtClean="0"/>
-              <a:t>26/02/2013</a:t>
+              <a:t>27/02/2013</a:t>
             </a:fld>
             <a:endParaRPr lang="nl-BE"/>
           </a:p>
@@ -1056,7 +1057,7 @@
           <a:p>
             <a:fld id="{C9E9C0BE-A832-44F7-BFB7-77E7A556107C}" type="datetimeFigureOut">
               <a:rPr lang="nl-BE" smtClean="0"/>
-              <a:t>26/02/2013</a:t>
+              <a:t>27/02/2013</a:t>
             </a:fld>
             <a:endParaRPr lang="nl-BE"/>
           </a:p>
@@ -1344,7 +1345,7 @@
           <a:p>
             <a:fld id="{C9E9C0BE-A832-44F7-BFB7-77E7A556107C}" type="datetimeFigureOut">
               <a:rPr lang="nl-BE" smtClean="0"/>
-              <a:t>26/02/2013</a:t>
+              <a:t>27/02/2013</a:t>
             </a:fld>
             <a:endParaRPr lang="nl-BE"/>
           </a:p>
@@ -1766,7 +1767,7 @@
           <a:p>
             <a:fld id="{C9E9C0BE-A832-44F7-BFB7-77E7A556107C}" type="datetimeFigureOut">
               <a:rPr lang="nl-BE" smtClean="0"/>
-              <a:t>26/02/2013</a:t>
+              <a:t>27/02/2013</a:t>
             </a:fld>
             <a:endParaRPr lang="nl-BE"/>
           </a:p>
@@ -1884,7 +1885,7 @@
           <a:p>
             <a:fld id="{C9E9C0BE-A832-44F7-BFB7-77E7A556107C}" type="datetimeFigureOut">
               <a:rPr lang="nl-BE" smtClean="0"/>
-              <a:t>26/02/2013</a:t>
+              <a:t>27/02/2013</a:t>
             </a:fld>
             <a:endParaRPr lang="nl-BE"/>
           </a:p>
@@ -1979,7 +1980,7 @@
           <a:p>
             <a:fld id="{C9E9C0BE-A832-44F7-BFB7-77E7A556107C}" type="datetimeFigureOut">
               <a:rPr lang="nl-BE" smtClean="0"/>
-              <a:t>26/02/2013</a:t>
+              <a:t>27/02/2013</a:t>
             </a:fld>
             <a:endParaRPr lang="nl-BE"/>
           </a:p>
@@ -2256,7 +2257,7 @@
           <a:p>
             <a:fld id="{C9E9C0BE-A832-44F7-BFB7-77E7A556107C}" type="datetimeFigureOut">
               <a:rPr lang="nl-BE" smtClean="0"/>
-              <a:t>26/02/2013</a:t>
+              <a:t>27/02/2013</a:t>
             </a:fld>
             <a:endParaRPr lang="nl-BE"/>
           </a:p>
@@ -2509,7 +2510,7 @@
           <a:p>
             <a:fld id="{C9E9C0BE-A832-44F7-BFB7-77E7A556107C}" type="datetimeFigureOut">
               <a:rPr lang="nl-BE" smtClean="0"/>
-              <a:t>26/02/2013</a:t>
+              <a:t>27/02/2013</a:t>
             </a:fld>
             <a:endParaRPr lang="nl-BE"/>
           </a:p>
@@ -2722,7 +2723,7 @@
           <a:p>
             <a:fld id="{C9E9C0BE-A832-44F7-BFB7-77E7A556107C}" type="datetimeFigureOut">
               <a:rPr lang="nl-BE" smtClean="0"/>
-              <a:t>26/02/2013</a:t>
+              <a:t>27/02/2013</a:t>
             </a:fld>
             <a:endParaRPr lang="nl-BE"/>
           </a:p>
@@ -3097,551 +3098,704 @@
           <a:chExt cx="0" cy="0"/>
         </a:xfrm>
       </p:grpSpPr>
-      <p:sp>
-        <p:nvSpPr>
-          <p:cNvPr id="4" name="Tekstvak 3"/>
-          <p:cNvSpPr txBox="1">
-            <a:spLocks noChangeAspect="1"/>
-          </p:cNvSpPr>
+      <p:grpSp>
+        <p:nvGrpSpPr>
+          <p:cNvPr id="107" name="Groep 106"/>
+          <p:cNvGrpSpPr/>
           <p:nvPr/>
-        </p:nvSpPr>
-        <p:spPr>
+        </p:nvGrpSpPr>
+        <p:grpSpPr>
           <a:xfrm>
-            <a:off x="3563888" y="476672"/>
-            <a:ext cx="2736304" cy="523220"/>
+            <a:off x="142640" y="427566"/>
+            <a:ext cx="8389800" cy="5059749"/>
+            <a:chOff x="142640" y="427566"/>
+            <a:chExt cx="8389800" cy="5059749"/>
           </a:xfrm>
-          <a:prstGeom prst="rect">
-            <a:avLst/>
-          </a:prstGeom>
-          <a:noFill/>
-          <a:ln>
-            <a:solidFill>
-              <a:schemeClr val="tx1"/>
-            </a:solidFill>
-          </a:ln>
-        </p:spPr>
-        <p:txBody>
-          <a:bodyPr wrap="square" rtlCol="0" anchor="ctr" anchorCtr="1">
-            <a:spAutoFit/>
-          </a:bodyPr>
-          <a:lstStyle>
-            <a:defPPr>
-              <a:defRPr lang="nl-BE"/>
-            </a:defPPr>
-            <a:lvl1pPr algn="ctr">
-              <a:defRPr sz="2800" b="1">
+        </p:grpSpPr>
+        <p:grpSp>
+          <p:nvGrpSpPr>
+            <p:cNvPr id="104" name="Groep 103"/>
+            <p:cNvGrpSpPr/>
+            <p:nvPr/>
+          </p:nvGrpSpPr>
+          <p:grpSpPr>
+            <a:xfrm>
+              <a:off x="1510792" y="3121479"/>
+              <a:ext cx="5977532" cy="1965726"/>
+              <a:chOff x="1510792" y="3121479"/>
+              <a:chExt cx="5977532" cy="1965726"/>
+            </a:xfrm>
+          </p:grpSpPr>
+          <p:cxnSp>
+            <p:nvCxnSpPr>
+              <p:cNvPr id="34" name="Gebogen verbindingslijn 33"/>
+              <p:cNvCxnSpPr>
+                <a:stCxn id="70" idx="2"/>
+                <a:endCxn id="19" idx="0"/>
+              </p:cNvCxnSpPr>
+              <p:nvPr/>
+            </p:nvCxnSpPr>
+            <p:spPr>
+              <a:xfrm rot="16200000" flipH="1">
+                <a:off x="3351095" y="2815482"/>
+                <a:ext cx="914908" cy="1526902"/>
+              </a:xfrm>
+              <a:prstGeom prst="bentConnector3">
+                <a:avLst>
+                  <a:gd name="adj1" fmla="val 50000"/>
+                </a:avLst>
+              </a:prstGeom>
+              <a:ln w="31750">
                 <a:solidFill>
-                  <a:srgbClr val="FF0000"/>
+                  <a:srgbClr val="96329E"/>
                 </a:solidFill>
-                <a:latin typeface="Times New Roman" pitchFamily="18" charset="0"/>
-                <a:cs typeface="Times New Roman" pitchFamily="18" charset="0"/>
-              </a:defRPr>
-            </a:lvl1pPr>
-          </a:lstStyle>
-          <a:p>
-            <a:r>
-              <a:rPr lang="nl-BE" dirty="0"/>
-              <a:t>Gui</a:t>
-            </a:r>
-          </a:p>
-        </p:txBody>
-      </p:sp>
-      <p:sp>
-        <p:nvSpPr>
-          <p:cNvPr id="6" name="Tekstvak 5"/>
-          <p:cNvSpPr txBox="1">
-            <a:spLocks noChangeAspect="1"/>
-          </p:cNvSpPr>
-          <p:nvPr/>
-        </p:nvSpPr>
-        <p:spPr>
-          <a:xfrm>
-            <a:off x="3563888" y="1614435"/>
-            <a:ext cx="2736304" cy="461665"/>
-          </a:xfrm>
-          <a:prstGeom prst="rect">
-            <a:avLst/>
-          </a:prstGeom>
-          <a:noFill/>
-          <a:ln>
-            <a:solidFill>
-              <a:schemeClr val="tx1"/>
-            </a:solidFill>
-          </a:ln>
-        </p:spPr>
-        <p:txBody>
-          <a:bodyPr wrap="square" rtlCol="0" anchor="ctr" anchorCtr="1">
-            <a:spAutoFit/>
-          </a:bodyPr>
-          <a:lstStyle/>
-          <a:p>
-            <a:pPr algn="ctr"/>
-            <a:r>
-              <a:rPr lang="nl-BE" sz="2400" dirty="0" err="1" smtClean="0">
-                <a:latin typeface="Times New Roman" pitchFamily="18" charset="0"/>
-                <a:cs typeface="Times New Roman" pitchFamily="18" charset="0"/>
-              </a:rPr>
-              <a:t>SimulatorPanel</a:t>
-            </a:r>
-            <a:endParaRPr lang="nl-BE" dirty="0">
-              <a:latin typeface="Times New Roman" pitchFamily="18" charset="0"/>
-              <a:cs typeface="Times New Roman" pitchFamily="18" charset="0"/>
-            </a:endParaRPr>
-          </a:p>
-        </p:txBody>
-      </p:sp>
-      <p:sp>
-        <p:nvSpPr>
-          <p:cNvPr id="17" name="Tekstvak 16"/>
-          <p:cNvSpPr txBox="1">
-            <a:spLocks noChangeAspect="1"/>
-          </p:cNvSpPr>
-          <p:nvPr/>
-        </p:nvSpPr>
-        <p:spPr>
-          <a:xfrm>
-            <a:off x="5076890" y="4077072"/>
-            <a:ext cx="2736304" cy="461665"/>
-          </a:xfrm>
-          <a:prstGeom prst="rect">
-            <a:avLst/>
-          </a:prstGeom>
-          <a:noFill/>
-          <a:ln>
-            <a:solidFill>
-              <a:schemeClr val="tx1"/>
-            </a:solidFill>
-          </a:ln>
-        </p:spPr>
-        <p:txBody>
-          <a:bodyPr wrap="square" rtlCol="0" anchor="ctr" anchorCtr="1">
-            <a:spAutoFit/>
-          </a:bodyPr>
-          <a:lstStyle/>
-          <a:p>
-            <a:pPr algn="ctr"/>
-            <a:r>
-              <a:rPr lang="nl-BE" sz="2400" smtClean="0">
-                <a:latin typeface="Times New Roman" pitchFamily="18" charset="0"/>
-                <a:cs typeface="Times New Roman" pitchFamily="18" charset="0"/>
-              </a:rPr>
-              <a:t>SimulatorViewport</a:t>
-            </a:r>
-            <a:endParaRPr lang="nl-BE" dirty="0">
-              <a:latin typeface="Times New Roman" pitchFamily="18" charset="0"/>
-              <a:cs typeface="Times New Roman" pitchFamily="18" charset="0"/>
-            </a:endParaRPr>
-          </a:p>
-        </p:txBody>
-      </p:sp>
-      <p:sp>
-        <p:nvSpPr>
-          <p:cNvPr id="18" name="Tekstvak 17"/>
-          <p:cNvSpPr txBox="1">
-            <a:spLocks noChangeAspect="1"/>
-          </p:cNvSpPr>
-          <p:nvPr/>
-        </p:nvSpPr>
-        <p:spPr>
-          <a:xfrm>
-            <a:off x="2051720" y="4077069"/>
-            <a:ext cx="2736304" cy="461665"/>
-          </a:xfrm>
-          <a:prstGeom prst="rect">
-            <a:avLst/>
-          </a:prstGeom>
-          <a:noFill/>
-          <a:ln>
-            <a:solidFill>
-              <a:schemeClr val="tx1"/>
-            </a:solidFill>
-          </a:ln>
-        </p:spPr>
-        <p:txBody>
-          <a:bodyPr wrap="square" rtlCol="0" anchor="ctr" anchorCtr="1">
-            <a:spAutoFit/>
-          </a:bodyPr>
-          <a:lstStyle/>
-          <a:p>
-            <a:pPr algn="ctr"/>
-            <a:r>
-              <a:rPr lang="nl-BE" sz="2400" dirty="0" err="1" smtClean="0">
-                <a:latin typeface="Times New Roman" pitchFamily="18" charset="0"/>
-                <a:cs typeface="Times New Roman" pitchFamily="18" charset="0"/>
-              </a:rPr>
-              <a:t>OverallViewport</a:t>
-            </a:r>
-            <a:endParaRPr lang="nl-BE" dirty="0">
-              <a:latin typeface="Times New Roman" pitchFamily="18" charset="0"/>
-              <a:cs typeface="Times New Roman" pitchFamily="18" charset="0"/>
-            </a:endParaRPr>
-          </a:p>
-        </p:txBody>
-      </p:sp>
-      <p:cxnSp>
-        <p:nvCxnSpPr>
-          <p:cNvPr id="32" name="Rechte verbindingslijn met pijl 31"/>
-          <p:cNvCxnSpPr>
-            <a:stCxn id="6" idx="0"/>
-            <a:endCxn id="4" idx="2"/>
-          </p:cNvCxnSpPr>
-          <p:nvPr/>
-        </p:nvCxnSpPr>
-        <p:spPr>
-          <a:xfrm flipV="1">
-            <a:off x="4932040" y="999892"/>
-            <a:ext cx="0" cy="614543"/>
-          </a:xfrm>
-          <a:prstGeom prst="straightConnector1">
-            <a:avLst/>
-          </a:prstGeom>
-          <a:ln w="31750">
-            <a:headEnd w="lg" len="lg"/>
-            <a:tailEnd type="arrow" w="lg" len="lg"/>
-          </a:ln>
-        </p:spPr>
-        <p:style>
-          <a:lnRef idx="1">
-            <a:schemeClr val="accent1"/>
-          </a:lnRef>
-          <a:fillRef idx="0">
-            <a:schemeClr val="accent1"/>
-          </a:fillRef>
-          <a:effectRef idx="0">
-            <a:schemeClr val="accent1"/>
-          </a:effectRef>
-          <a:fontRef idx="minor">
-            <a:schemeClr val="tx1"/>
-          </a:fontRef>
-        </p:style>
-      </p:cxnSp>
-      <p:cxnSp>
-        <p:nvCxnSpPr>
-          <p:cNvPr id="34" name="Gebogen verbindingslijn 33"/>
-          <p:cNvCxnSpPr>
-            <a:stCxn id="17" idx="0"/>
-            <a:endCxn id="70" idx="2"/>
-          </p:cNvCxnSpPr>
-          <p:nvPr/>
-        </p:nvCxnSpPr>
-        <p:spPr>
-          <a:xfrm rot="16200000" flipV="1">
-            <a:off x="5235298" y="2867328"/>
-            <a:ext cx="906487" cy="1513002"/>
-          </a:xfrm>
-          <a:prstGeom prst="bentConnector3">
-            <a:avLst>
-              <a:gd name="adj1" fmla="val 50000"/>
-            </a:avLst>
-          </a:prstGeom>
-          <a:ln w="31750">
-            <a:headEnd w="lg" len="lg"/>
-            <a:tailEnd type="arrow" w="lg" len="lg"/>
-          </a:ln>
-        </p:spPr>
-        <p:style>
-          <a:lnRef idx="1">
-            <a:schemeClr val="accent1"/>
-          </a:lnRef>
-          <a:fillRef idx="0">
-            <a:schemeClr val="accent1"/>
-          </a:fillRef>
-          <a:effectRef idx="0">
-            <a:schemeClr val="accent1"/>
-          </a:effectRef>
-          <a:fontRef idx="minor">
-            <a:schemeClr val="tx1"/>
-          </a:fontRef>
-        </p:style>
-      </p:cxnSp>
-      <p:cxnSp>
-        <p:nvCxnSpPr>
-          <p:cNvPr id="36" name="Gebogen verbindingslijn 35"/>
-          <p:cNvCxnSpPr>
-            <a:stCxn id="18" idx="0"/>
-            <a:endCxn id="70" idx="2"/>
-          </p:cNvCxnSpPr>
-          <p:nvPr/>
-        </p:nvCxnSpPr>
-        <p:spPr>
-          <a:xfrm rot="5400000" flipH="1" flipV="1">
-            <a:off x="3722714" y="2867743"/>
-            <a:ext cx="906484" cy="1512168"/>
-          </a:xfrm>
-          <a:prstGeom prst="bentConnector3">
-            <a:avLst>
-              <a:gd name="adj1" fmla="val 50000"/>
-            </a:avLst>
-          </a:prstGeom>
-          <a:ln w="31750">
-            <a:headEnd w="lg" len="lg"/>
-            <a:tailEnd type="arrow" w="lg" len="lg"/>
-          </a:ln>
-        </p:spPr>
-        <p:style>
-          <a:lnRef idx="1">
-            <a:schemeClr val="accent1"/>
-          </a:lnRef>
-          <a:fillRef idx="0">
-            <a:schemeClr val="accent1"/>
-          </a:fillRef>
-          <a:effectRef idx="0">
-            <a:schemeClr val="accent1"/>
-          </a:effectRef>
-          <a:fontRef idx="minor">
-            <a:schemeClr val="tx1"/>
-          </a:fontRef>
-        </p:style>
-      </p:cxnSp>
-      <p:sp>
-        <p:nvSpPr>
-          <p:cNvPr id="70" name="Tekstvak 69"/>
-          <p:cNvSpPr txBox="1">
-            <a:spLocks noChangeAspect="1"/>
-          </p:cNvSpPr>
-          <p:nvPr/>
-        </p:nvSpPr>
-        <p:spPr>
-          <a:xfrm>
-            <a:off x="3563888" y="2708920"/>
-            <a:ext cx="2736304" cy="461665"/>
-          </a:xfrm>
-          <a:prstGeom prst="rect">
-            <a:avLst/>
-          </a:prstGeom>
-          <a:noFill/>
-          <a:ln>
-            <a:solidFill>
-              <a:schemeClr val="tx1"/>
-            </a:solidFill>
-          </a:ln>
-        </p:spPr>
-        <p:txBody>
-          <a:bodyPr wrap="square" rtlCol="0" anchor="ctr" anchorCtr="1">
-            <a:spAutoFit/>
-          </a:bodyPr>
-          <a:lstStyle/>
-          <a:p>
-            <a:pPr algn="ctr"/>
-            <a:r>
-              <a:rPr lang="nl-BE" sz="2400" dirty="0" err="1" smtClean="0">
-                <a:latin typeface="Times New Roman" pitchFamily="18" charset="0"/>
-                <a:cs typeface="Times New Roman" pitchFamily="18" charset="0"/>
-              </a:rPr>
-              <a:t>AbstractViewport</a:t>
-            </a:r>
-            <a:endParaRPr lang="nl-BE" dirty="0">
-              <a:latin typeface="Times New Roman" pitchFamily="18" charset="0"/>
-              <a:cs typeface="Times New Roman" pitchFamily="18" charset="0"/>
-            </a:endParaRPr>
-          </a:p>
-        </p:txBody>
-      </p:sp>
-      <p:cxnSp>
-        <p:nvCxnSpPr>
-          <p:cNvPr id="78" name="Rechte verbindingslijn met pijl 77"/>
-          <p:cNvCxnSpPr>
-            <a:stCxn id="70" idx="0"/>
-            <a:endCxn id="6" idx="2"/>
-          </p:cNvCxnSpPr>
-          <p:nvPr/>
-        </p:nvCxnSpPr>
-        <p:spPr>
-          <a:xfrm flipV="1">
-            <a:off x="4932040" y="2076100"/>
-            <a:ext cx="0" cy="632820"/>
-          </a:xfrm>
-          <a:prstGeom prst="straightConnector1">
-            <a:avLst/>
-          </a:prstGeom>
-          <a:ln w="31750">
-            <a:headEnd w="lg" len="lg"/>
-            <a:tailEnd type="arrow" w="lg" len="lg"/>
-          </a:ln>
-        </p:spPr>
-        <p:style>
-          <a:lnRef idx="1">
-            <a:schemeClr val="accent1"/>
-          </a:lnRef>
-          <a:fillRef idx="0">
-            <a:schemeClr val="accent1"/>
-          </a:fillRef>
-          <a:effectRef idx="0">
-            <a:schemeClr val="accent1"/>
-          </a:effectRef>
-          <a:fontRef idx="minor">
-            <a:schemeClr val="tx1"/>
-          </a:fontRef>
-        </p:style>
-      </p:cxnSp>
-      <p:sp>
-        <p:nvSpPr>
-          <p:cNvPr id="82" name="Tekstvak 81"/>
-          <p:cNvSpPr txBox="1">
-            <a:spLocks noChangeAspect="1"/>
-          </p:cNvSpPr>
-          <p:nvPr/>
-        </p:nvSpPr>
-        <p:spPr>
-          <a:xfrm>
-            <a:off x="5076890" y="5149112"/>
-            <a:ext cx="2736304" cy="400110"/>
-          </a:xfrm>
-          <a:prstGeom prst="rect">
-            <a:avLst/>
-          </a:prstGeom>
-          <a:noFill/>
-          <a:ln>
-            <a:solidFill>
-              <a:schemeClr val="tx1"/>
-            </a:solidFill>
-          </a:ln>
-        </p:spPr>
-        <p:txBody>
-          <a:bodyPr wrap="square" rtlCol="0" anchor="ctr" anchorCtr="1">
-            <a:spAutoFit/>
-          </a:bodyPr>
-          <a:lstStyle>
-            <a:defPPr>
-              <a:defRPr lang="nl-BE"/>
-            </a:defPPr>
-            <a:lvl1pPr algn="ctr">
-              <a:defRPr sz="2000">
-                <a:latin typeface="Times New Roman" pitchFamily="18" charset="0"/>
-                <a:cs typeface="Times New Roman" pitchFamily="18" charset="0"/>
-              </a:defRPr>
-            </a:lvl1pPr>
-          </a:lstStyle>
-          <a:p>
-            <a:r>
-              <a:rPr lang="nl-BE" i="1" dirty="0" err="1" smtClean="0"/>
-              <a:t>PilotInterface</a:t>
-            </a:r>
-            <a:endParaRPr lang="nl-BE" i="1" dirty="0"/>
-          </a:p>
-        </p:txBody>
-      </p:sp>
-      <p:cxnSp>
-        <p:nvCxnSpPr>
-          <p:cNvPr id="83" name="Rechte verbindingslijn met pijl 82"/>
-          <p:cNvCxnSpPr>
-            <a:stCxn id="82" idx="0"/>
-            <a:endCxn id="17" idx="2"/>
-          </p:cNvCxnSpPr>
-          <p:nvPr/>
-        </p:nvCxnSpPr>
-        <p:spPr>
-          <a:xfrm flipV="1">
-            <a:off x="6445042" y="4538737"/>
-            <a:ext cx="0" cy="610375"/>
-          </a:xfrm>
-          <a:prstGeom prst="straightConnector1">
-            <a:avLst/>
-          </a:prstGeom>
-          <a:ln w="31750">
-            <a:headEnd w="lg" len="lg"/>
-            <a:tailEnd type="arrow" w="lg" len="lg"/>
-          </a:ln>
-        </p:spPr>
-        <p:style>
-          <a:lnRef idx="1">
-            <a:schemeClr val="accent1"/>
-          </a:lnRef>
-          <a:fillRef idx="0">
-            <a:schemeClr val="accent1"/>
-          </a:fillRef>
-          <a:effectRef idx="0">
-            <a:schemeClr val="accent1"/>
-          </a:effectRef>
-          <a:fontRef idx="minor">
-            <a:schemeClr val="tx1"/>
-          </a:fontRef>
-        </p:style>
-      </p:cxnSp>
-      <p:sp>
-        <p:nvSpPr>
-          <p:cNvPr id="88" name="Tekstvak 87"/>
-          <p:cNvSpPr txBox="1">
-            <a:spLocks noChangeAspect="1"/>
-          </p:cNvSpPr>
-          <p:nvPr/>
-        </p:nvSpPr>
-        <p:spPr>
-          <a:xfrm>
-            <a:off x="5076890" y="6093296"/>
-            <a:ext cx="2736304" cy="400110"/>
-          </a:xfrm>
-          <a:prstGeom prst="rect">
-            <a:avLst/>
-          </a:prstGeom>
-          <a:noFill/>
-          <a:ln>
-            <a:solidFill>
-              <a:schemeClr val="tx1"/>
-            </a:solidFill>
-          </a:ln>
-        </p:spPr>
-        <p:txBody>
-          <a:bodyPr wrap="square" rtlCol="0" anchor="ctr" anchorCtr="1">
-            <a:spAutoFit/>
-          </a:bodyPr>
-          <a:lstStyle>
-            <a:defPPr>
-              <a:defRPr lang="nl-BE"/>
-            </a:defPPr>
-            <a:lvl1pPr algn="ctr">
-              <a:defRPr sz="2000">
-                <a:latin typeface="Times New Roman" pitchFamily="18" charset="0"/>
-                <a:cs typeface="Times New Roman" pitchFamily="18" charset="0"/>
-              </a:defRPr>
-            </a:lvl1pPr>
-          </a:lstStyle>
-          <a:p>
-            <a:r>
-              <a:rPr lang="nl-BE" dirty="0" smtClean="0"/>
-              <a:t>…</a:t>
-            </a:r>
-            <a:endParaRPr lang="nl-BE" dirty="0"/>
-          </a:p>
-        </p:txBody>
-      </p:sp>
-      <p:cxnSp>
-        <p:nvCxnSpPr>
-          <p:cNvPr id="89" name="Rechte verbindingslijn met pijl 88"/>
-          <p:cNvCxnSpPr>
-            <a:stCxn id="88" idx="0"/>
-            <a:endCxn id="82" idx="2"/>
-          </p:cNvCxnSpPr>
-          <p:nvPr/>
-        </p:nvCxnSpPr>
-        <p:spPr>
-          <a:xfrm flipV="1">
-            <a:off x="6445042" y="5549222"/>
-            <a:ext cx="0" cy="544074"/>
-          </a:xfrm>
-          <a:prstGeom prst="straightConnector1">
-            <a:avLst/>
-          </a:prstGeom>
-          <a:ln w="31750">
-            <a:headEnd w="lg" len="lg"/>
-            <a:tailEnd type="arrow" w="lg" len="lg"/>
-          </a:ln>
-        </p:spPr>
-        <p:style>
-          <a:lnRef idx="1">
-            <a:schemeClr val="accent1"/>
-          </a:lnRef>
-          <a:fillRef idx="0">
-            <a:schemeClr val="accent1"/>
-          </a:fillRef>
-          <a:effectRef idx="0">
-            <a:schemeClr val="accent1"/>
-          </a:effectRef>
-          <a:fontRef idx="minor">
-            <a:schemeClr val="tx1"/>
-          </a:fontRef>
-        </p:style>
-      </p:cxnSp>
+                <a:headEnd w="lg" len="lg"/>
+                <a:tailEnd type="arrow" w="lg" len="lg"/>
+              </a:ln>
+            </p:spPr>
+            <p:style>
+              <a:lnRef idx="1">
+                <a:schemeClr val="accent1"/>
+              </a:lnRef>
+              <a:fillRef idx="0">
+                <a:schemeClr val="accent1"/>
+              </a:fillRef>
+              <a:effectRef idx="0">
+                <a:schemeClr val="accent1"/>
+              </a:effectRef>
+              <a:fontRef idx="minor">
+                <a:schemeClr val="tx1"/>
+              </a:fontRef>
+            </p:style>
+          </p:cxnSp>
+          <p:cxnSp>
+            <p:nvCxnSpPr>
+              <p:cNvPr id="36" name="Gebogen verbindingslijn 35"/>
+              <p:cNvCxnSpPr>
+                <a:stCxn id="70" idx="2"/>
+                <a:endCxn id="18" idx="0"/>
+              </p:cNvCxnSpPr>
+              <p:nvPr/>
+            </p:nvCxnSpPr>
+            <p:spPr>
+              <a:xfrm rot="5400000">
+                <a:off x="1821523" y="2810748"/>
+                <a:ext cx="912844" cy="1534306"/>
+              </a:xfrm>
+              <a:prstGeom prst="bentConnector3">
+                <a:avLst>
+                  <a:gd name="adj1" fmla="val 50000"/>
+                </a:avLst>
+              </a:prstGeom>
+              <a:ln w="31750">
+                <a:solidFill>
+                  <a:srgbClr val="96329E"/>
+                </a:solidFill>
+                <a:headEnd w="lg" len="lg"/>
+                <a:tailEnd type="arrow" w="lg" len="lg"/>
+              </a:ln>
+            </p:spPr>
+            <p:style>
+              <a:lnRef idx="1">
+                <a:schemeClr val="accent1"/>
+              </a:lnRef>
+              <a:fillRef idx="0">
+                <a:schemeClr val="accent1"/>
+              </a:fillRef>
+              <a:effectRef idx="0">
+                <a:schemeClr val="accent1"/>
+              </a:effectRef>
+              <a:fontRef idx="minor">
+                <a:schemeClr val="tx1"/>
+              </a:fontRef>
+            </p:style>
+          </p:cxnSp>
+          <p:cxnSp>
+            <p:nvCxnSpPr>
+              <p:cNvPr id="83" name="Rechte verbindingslijn met pijl 82"/>
+              <p:cNvCxnSpPr>
+                <a:stCxn id="19" idx="2"/>
+                <a:endCxn id="17" idx="0"/>
+              </p:cNvCxnSpPr>
+              <p:nvPr/>
+            </p:nvCxnSpPr>
+            <p:spPr>
+              <a:xfrm>
+                <a:off x="4572000" y="4498052"/>
+                <a:ext cx="0" cy="527598"/>
+              </a:xfrm>
+              <a:prstGeom prst="straightConnector1">
+                <a:avLst/>
+              </a:prstGeom>
+              <a:ln w="31750">
+                <a:solidFill>
+                  <a:srgbClr val="96329E"/>
+                </a:solidFill>
+                <a:headEnd w="lg" len="lg"/>
+                <a:tailEnd type="arrow" w="lg" len="lg"/>
+              </a:ln>
+            </p:spPr>
+            <p:style>
+              <a:lnRef idx="1">
+                <a:schemeClr val="accent1"/>
+              </a:lnRef>
+              <a:fillRef idx="0">
+                <a:schemeClr val="accent1"/>
+              </a:fillRef>
+              <a:effectRef idx="0">
+                <a:schemeClr val="accent1"/>
+              </a:effectRef>
+              <a:fontRef idx="minor">
+                <a:schemeClr val="tx1"/>
+              </a:fontRef>
+            </p:style>
+          </p:cxnSp>
+          <p:cxnSp>
+            <p:nvCxnSpPr>
+              <p:cNvPr id="89" name="Rechte verbindingslijn met pijl 88"/>
+              <p:cNvCxnSpPr>
+                <a:stCxn id="82" idx="2"/>
+                <a:endCxn id="88" idx="0"/>
+              </p:cNvCxnSpPr>
+              <p:nvPr/>
+            </p:nvCxnSpPr>
+            <p:spPr>
+              <a:xfrm>
+                <a:off x="7488324" y="4498052"/>
+                <a:ext cx="0" cy="589153"/>
+              </a:xfrm>
+              <a:prstGeom prst="straightConnector1">
+                <a:avLst/>
+              </a:prstGeom>
+              <a:ln w="31750">
+                <a:solidFill>
+                  <a:srgbClr val="96329E"/>
+                </a:solidFill>
+                <a:headEnd w="lg" len="lg"/>
+                <a:tailEnd type="arrow" w="lg" len="lg"/>
+              </a:ln>
+            </p:spPr>
+            <p:style>
+              <a:lnRef idx="1">
+                <a:schemeClr val="accent1"/>
+              </a:lnRef>
+              <a:fillRef idx="0">
+                <a:schemeClr val="accent1"/>
+              </a:fillRef>
+              <a:effectRef idx="0">
+                <a:schemeClr val="accent1"/>
+              </a:effectRef>
+              <a:fontRef idx="minor">
+                <a:schemeClr val="tx1"/>
+              </a:fontRef>
+            </p:style>
+          </p:cxnSp>
+        </p:grpSp>
+        <p:grpSp>
+          <p:nvGrpSpPr>
+            <p:cNvPr id="106" name="Groep 105"/>
+            <p:cNvGrpSpPr/>
+            <p:nvPr/>
+          </p:nvGrpSpPr>
+          <p:grpSpPr>
+            <a:xfrm>
+              <a:off x="142640" y="427566"/>
+              <a:ext cx="8389800" cy="5059749"/>
+              <a:chOff x="142640" y="427566"/>
+              <a:chExt cx="8389800" cy="5059749"/>
+            </a:xfrm>
+          </p:grpSpPr>
+          <p:sp>
+            <p:nvSpPr>
+              <p:cNvPr id="4" name="Tekstvak 3"/>
+              <p:cNvSpPr txBox="1">
+                <a:spLocks noChangeAspect="1"/>
+              </p:cNvSpPr>
+              <p:nvPr/>
+            </p:nvSpPr>
+            <p:spPr>
+              <a:xfrm>
+                <a:off x="1676946" y="427566"/>
+                <a:ext cx="2736304" cy="523220"/>
+              </a:xfrm>
+              <a:prstGeom prst="rect">
+                <a:avLst/>
+              </a:prstGeom>
+              <a:noFill/>
+              <a:ln>
+                <a:solidFill>
+                  <a:schemeClr val="tx1"/>
+                </a:solidFill>
+              </a:ln>
+            </p:spPr>
+            <p:txBody>
+              <a:bodyPr wrap="square" rtlCol="0" anchor="ctr" anchorCtr="1">
+                <a:spAutoFit/>
+              </a:bodyPr>
+              <a:lstStyle>
+                <a:defPPr>
+                  <a:defRPr lang="nl-BE"/>
+                </a:defPPr>
+                <a:lvl1pPr algn="ctr">
+                  <a:defRPr sz="2800" b="1">
+                    <a:solidFill>
+                      <a:srgbClr val="FF0000"/>
+                    </a:solidFill>
+                    <a:latin typeface="Times New Roman" pitchFamily="18" charset="0"/>
+                    <a:cs typeface="Times New Roman" pitchFamily="18" charset="0"/>
+                  </a:defRPr>
+                </a:lvl1pPr>
+              </a:lstStyle>
+              <a:p>
+                <a:r>
+                  <a:rPr lang="nl-BE" dirty="0"/>
+                  <a:t>Gui</a:t>
+                </a:r>
+              </a:p>
+            </p:txBody>
+          </p:sp>
+          <p:sp>
+            <p:nvSpPr>
+              <p:cNvPr id="6" name="Tekstvak 5"/>
+              <p:cNvSpPr txBox="1">
+                <a:spLocks noChangeAspect="1"/>
+              </p:cNvSpPr>
+              <p:nvPr/>
+            </p:nvSpPr>
+            <p:spPr>
+              <a:xfrm>
+                <a:off x="1676946" y="1568558"/>
+                <a:ext cx="2736304" cy="461665"/>
+              </a:xfrm>
+              <a:prstGeom prst="rect">
+                <a:avLst/>
+              </a:prstGeom>
+              <a:noFill/>
+              <a:ln>
+                <a:solidFill>
+                  <a:schemeClr val="tx1"/>
+                </a:solidFill>
+              </a:ln>
+            </p:spPr>
+            <p:txBody>
+              <a:bodyPr wrap="square" rtlCol="0" anchor="ctr" anchorCtr="1">
+                <a:spAutoFit/>
+              </a:bodyPr>
+              <a:lstStyle/>
+              <a:p>
+                <a:pPr algn="ctr"/>
+                <a:r>
+                  <a:rPr lang="nl-BE" sz="2400" dirty="0" err="1" smtClean="0">
+                    <a:latin typeface="Times New Roman" pitchFamily="18" charset="0"/>
+                    <a:cs typeface="Times New Roman" pitchFamily="18" charset="0"/>
+                  </a:rPr>
+                  <a:t>SimulatorPanel</a:t>
+                </a:r>
+                <a:endParaRPr lang="nl-BE" dirty="0">
+                  <a:latin typeface="Times New Roman" pitchFamily="18" charset="0"/>
+                  <a:cs typeface="Times New Roman" pitchFamily="18" charset="0"/>
+                </a:endParaRPr>
+              </a:p>
+            </p:txBody>
+          </p:sp>
+          <p:sp>
+            <p:nvSpPr>
+              <p:cNvPr id="17" name="Tekstvak 16"/>
+              <p:cNvSpPr txBox="1">
+                <a:spLocks noChangeAspect="1"/>
+              </p:cNvSpPr>
+              <p:nvPr/>
+            </p:nvSpPr>
+            <p:spPr>
+              <a:xfrm>
+                <a:off x="3203848" y="5025650"/>
+                <a:ext cx="2736304" cy="461665"/>
+              </a:xfrm>
+              <a:prstGeom prst="rect">
+                <a:avLst/>
+              </a:prstGeom>
+              <a:noFill/>
+              <a:ln>
+                <a:solidFill>
+                  <a:schemeClr val="tx1"/>
+                </a:solidFill>
+              </a:ln>
+            </p:spPr>
+            <p:txBody>
+              <a:bodyPr wrap="square" rtlCol="0" anchor="ctr" anchorCtr="1">
+                <a:spAutoFit/>
+              </a:bodyPr>
+              <a:lstStyle/>
+              <a:p>
+                <a:pPr algn="ctr"/>
+                <a:r>
+                  <a:rPr lang="nl-BE" sz="2400" dirty="0" err="1" smtClean="0">
+                    <a:latin typeface="Times New Roman" pitchFamily="18" charset="0"/>
+                    <a:cs typeface="Times New Roman" pitchFamily="18" charset="0"/>
+                  </a:rPr>
+                  <a:t>UnitViewport</a:t>
+                </a:r>
+                <a:endParaRPr lang="nl-BE" dirty="0">
+                  <a:latin typeface="Times New Roman" pitchFamily="18" charset="0"/>
+                  <a:cs typeface="Times New Roman" pitchFamily="18" charset="0"/>
+                </a:endParaRPr>
+              </a:p>
+            </p:txBody>
+          </p:sp>
+          <p:sp>
+            <p:nvSpPr>
+              <p:cNvPr id="18" name="Tekstvak 17"/>
+              <p:cNvSpPr txBox="1">
+                <a:spLocks noChangeAspect="1"/>
+              </p:cNvSpPr>
+              <p:nvPr/>
+            </p:nvSpPr>
+            <p:spPr>
+              <a:xfrm>
+                <a:off x="142640" y="4034323"/>
+                <a:ext cx="2736304" cy="461665"/>
+              </a:xfrm>
+              <a:prstGeom prst="rect">
+                <a:avLst/>
+              </a:prstGeom>
+              <a:noFill/>
+              <a:ln>
+                <a:solidFill>
+                  <a:schemeClr val="tx1"/>
+                </a:solidFill>
+              </a:ln>
+            </p:spPr>
+            <p:txBody>
+              <a:bodyPr wrap="square" rtlCol="0" anchor="ctr" anchorCtr="1">
+                <a:spAutoFit/>
+              </a:bodyPr>
+              <a:lstStyle/>
+              <a:p>
+                <a:pPr algn="ctr"/>
+                <a:r>
+                  <a:rPr lang="nl-BE" sz="2400" dirty="0" err="1" smtClean="0">
+                    <a:latin typeface="Times New Roman" pitchFamily="18" charset="0"/>
+                    <a:cs typeface="Times New Roman" pitchFamily="18" charset="0"/>
+                  </a:rPr>
+                  <a:t>OverallViewport</a:t>
+                </a:r>
+                <a:endParaRPr lang="nl-BE" dirty="0">
+                  <a:latin typeface="Times New Roman" pitchFamily="18" charset="0"/>
+                  <a:cs typeface="Times New Roman" pitchFamily="18" charset="0"/>
+                </a:endParaRPr>
+              </a:p>
+            </p:txBody>
+          </p:sp>
+          <p:sp>
+            <p:nvSpPr>
+              <p:cNvPr id="70" name="Tekstvak 69"/>
+              <p:cNvSpPr txBox="1">
+                <a:spLocks noChangeAspect="1"/>
+              </p:cNvSpPr>
+              <p:nvPr/>
+            </p:nvSpPr>
+            <p:spPr>
+              <a:xfrm>
+                <a:off x="1676946" y="2659814"/>
+                <a:ext cx="2736304" cy="461665"/>
+              </a:xfrm>
+              <a:prstGeom prst="rect">
+                <a:avLst/>
+              </a:prstGeom>
+              <a:noFill/>
+              <a:ln>
+                <a:solidFill>
+                  <a:schemeClr val="tx1"/>
+                </a:solidFill>
+              </a:ln>
+            </p:spPr>
+            <p:txBody>
+              <a:bodyPr wrap="square" rtlCol="0" anchor="ctr" anchorCtr="1">
+                <a:spAutoFit/>
+              </a:bodyPr>
+              <a:lstStyle/>
+              <a:p>
+                <a:pPr algn="ctr"/>
+                <a:r>
+                  <a:rPr lang="nl-BE" sz="2400" i="1" dirty="0" err="1" smtClean="0">
+                    <a:latin typeface="Times New Roman" pitchFamily="18" charset="0"/>
+                    <a:cs typeface="Times New Roman" pitchFamily="18" charset="0"/>
+                  </a:rPr>
+                  <a:t>ViewportInterface</a:t>
+                </a:r>
+                <a:endParaRPr lang="nl-BE" i="1" dirty="0">
+                  <a:latin typeface="Times New Roman" pitchFamily="18" charset="0"/>
+                  <a:cs typeface="Times New Roman" pitchFamily="18" charset="0"/>
+                </a:endParaRPr>
+              </a:p>
+            </p:txBody>
+          </p:sp>
+          <p:sp>
+            <p:nvSpPr>
+              <p:cNvPr id="82" name="Tekstvak 81"/>
+              <p:cNvSpPr txBox="1">
+                <a:spLocks noChangeAspect="1"/>
+              </p:cNvSpPr>
+              <p:nvPr/>
+            </p:nvSpPr>
+            <p:spPr>
+              <a:xfrm>
+                <a:off x="6444208" y="4036387"/>
+                <a:ext cx="2088232" cy="461665"/>
+              </a:xfrm>
+              <a:prstGeom prst="rect">
+                <a:avLst/>
+              </a:prstGeom>
+              <a:noFill/>
+              <a:ln>
+                <a:solidFill>
+                  <a:schemeClr val="tx1"/>
+                </a:solidFill>
+              </a:ln>
+            </p:spPr>
+            <p:txBody>
+              <a:bodyPr wrap="square" rtlCol="0" anchor="ctr" anchorCtr="1">
+                <a:spAutoFit/>
+              </a:bodyPr>
+              <a:lstStyle>
+                <a:defPPr>
+                  <a:defRPr lang="nl-BE"/>
+                </a:defPPr>
+                <a:lvl1pPr algn="ctr">
+                  <a:defRPr sz="2000">
+                    <a:latin typeface="Times New Roman" pitchFamily="18" charset="0"/>
+                    <a:cs typeface="Times New Roman" pitchFamily="18" charset="0"/>
+                  </a:defRPr>
+                </a:lvl1pPr>
+              </a:lstStyle>
+              <a:p>
+                <a:r>
+                  <a:rPr lang="nl-BE" sz="2400" i="1" dirty="0" err="1"/>
+                  <a:t>PilotInterface</a:t>
+                </a:r>
+                <a:endParaRPr lang="nl-BE" sz="2400" i="1" dirty="0"/>
+              </a:p>
+            </p:txBody>
+          </p:sp>
+          <p:sp>
+            <p:nvSpPr>
+              <p:cNvPr id="88" name="Tekstvak 87"/>
+              <p:cNvSpPr txBox="1">
+                <a:spLocks noChangeAspect="1"/>
+              </p:cNvSpPr>
+              <p:nvPr/>
+            </p:nvSpPr>
+            <p:spPr>
+              <a:xfrm>
+                <a:off x="6444208" y="5087205"/>
+                <a:ext cx="2088232" cy="400110"/>
+              </a:xfrm>
+              <a:prstGeom prst="rect">
+                <a:avLst/>
+              </a:prstGeom>
+              <a:noFill/>
+              <a:ln>
+                <a:solidFill>
+                  <a:schemeClr val="tx1"/>
+                </a:solidFill>
+              </a:ln>
+            </p:spPr>
+            <p:txBody>
+              <a:bodyPr wrap="square" rtlCol="0" anchor="ctr" anchorCtr="1">
+                <a:spAutoFit/>
+              </a:bodyPr>
+              <a:lstStyle>
+                <a:defPPr>
+                  <a:defRPr lang="nl-BE"/>
+                </a:defPPr>
+                <a:lvl1pPr algn="ctr">
+                  <a:defRPr sz="2000">
+                    <a:latin typeface="Times New Roman" pitchFamily="18" charset="0"/>
+                    <a:cs typeface="Times New Roman" pitchFamily="18" charset="0"/>
+                  </a:defRPr>
+                </a:lvl1pPr>
+              </a:lstStyle>
+              <a:p>
+                <a:r>
+                  <a:rPr lang="nl-BE" dirty="0" smtClean="0"/>
+                  <a:t>…</a:t>
+                </a:r>
+                <a:endParaRPr lang="nl-BE" dirty="0"/>
+              </a:p>
+            </p:txBody>
+          </p:sp>
+          <p:sp>
+            <p:nvSpPr>
+              <p:cNvPr id="19" name="Tekstvak 18"/>
+              <p:cNvSpPr txBox="1">
+                <a:spLocks noChangeAspect="1"/>
+              </p:cNvSpPr>
+              <p:nvPr/>
+            </p:nvSpPr>
+            <p:spPr>
+              <a:xfrm>
+                <a:off x="3203848" y="4036387"/>
+                <a:ext cx="2736304" cy="461665"/>
+              </a:xfrm>
+              <a:prstGeom prst="rect">
+                <a:avLst/>
+              </a:prstGeom>
+              <a:noFill/>
+              <a:ln>
+                <a:solidFill>
+                  <a:schemeClr val="tx1"/>
+                </a:solidFill>
+              </a:ln>
+            </p:spPr>
+            <p:txBody>
+              <a:bodyPr wrap="square" rtlCol="0" anchor="ctr" anchorCtr="1">
+                <a:spAutoFit/>
+              </a:bodyPr>
+              <a:lstStyle/>
+              <a:p>
+                <a:pPr algn="ctr"/>
+                <a:r>
+                  <a:rPr lang="nl-BE" sz="2400" dirty="0" err="1" smtClean="0">
+                    <a:latin typeface="Times New Roman" pitchFamily="18" charset="0"/>
+                    <a:cs typeface="Times New Roman" pitchFamily="18" charset="0"/>
+                  </a:rPr>
+                  <a:t>DummyViewport</a:t>
+                </a:r>
+                <a:endParaRPr lang="nl-BE" dirty="0">
+                  <a:latin typeface="Times New Roman" pitchFamily="18" charset="0"/>
+                  <a:cs typeface="Times New Roman" pitchFamily="18" charset="0"/>
+                </a:endParaRPr>
+              </a:p>
+            </p:txBody>
+          </p:sp>
+        </p:grpSp>
+        <p:grpSp>
+          <p:nvGrpSpPr>
+            <p:cNvPr id="105" name="Groep 104"/>
+            <p:cNvGrpSpPr/>
+            <p:nvPr/>
+          </p:nvGrpSpPr>
+          <p:grpSpPr>
+            <a:xfrm>
+              <a:off x="3045098" y="950786"/>
+              <a:ext cx="3399110" cy="3316434"/>
+              <a:chOff x="3045098" y="950786"/>
+              <a:chExt cx="3399110" cy="3316434"/>
+            </a:xfrm>
+          </p:grpSpPr>
+          <p:cxnSp>
+            <p:nvCxnSpPr>
+              <p:cNvPr id="32" name="Rechte verbindingslijn met pijl 31"/>
+              <p:cNvCxnSpPr>
+                <a:stCxn id="6" idx="0"/>
+                <a:endCxn id="4" idx="2"/>
+              </p:cNvCxnSpPr>
+              <p:nvPr/>
+            </p:nvCxnSpPr>
+            <p:spPr>
+              <a:xfrm flipV="1">
+                <a:off x="3045098" y="950786"/>
+                <a:ext cx="0" cy="617772"/>
+              </a:xfrm>
+              <a:prstGeom prst="straightConnector1">
+                <a:avLst/>
+              </a:prstGeom>
+              <a:ln w="31750">
+                <a:headEnd w="lg" len="lg"/>
+                <a:tailEnd type="arrow" w="lg" len="lg"/>
+              </a:ln>
+            </p:spPr>
+            <p:style>
+              <a:lnRef idx="1">
+                <a:schemeClr val="accent1"/>
+              </a:lnRef>
+              <a:fillRef idx="0">
+                <a:schemeClr val="accent1"/>
+              </a:fillRef>
+              <a:effectRef idx="0">
+                <a:schemeClr val="accent1"/>
+              </a:effectRef>
+              <a:fontRef idx="minor">
+                <a:schemeClr val="tx1"/>
+              </a:fontRef>
+            </p:style>
+          </p:cxnSp>
+          <p:cxnSp>
+            <p:nvCxnSpPr>
+              <p:cNvPr id="78" name="Rechte verbindingslijn met pijl 77"/>
+              <p:cNvCxnSpPr>
+                <a:stCxn id="70" idx="0"/>
+                <a:endCxn id="6" idx="2"/>
+              </p:cNvCxnSpPr>
+              <p:nvPr/>
+            </p:nvCxnSpPr>
+            <p:spPr>
+              <a:xfrm flipV="1">
+                <a:off x="3045098" y="2030223"/>
+                <a:ext cx="0" cy="629591"/>
+              </a:xfrm>
+              <a:prstGeom prst="straightConnector1">
+                <a:avLst/>
+              </a:prstGeom>
+              <a:ln w="31750">
+                <a:headEnd w="lg" len="lg"/>
+                <a:tailEnd type="arrow" w="lg" len="lg"/>
+              </a:ln>
+            </p:spPr>
+            <p:style>
+              <a:lnRef idx="1">
+                <a:schemeClr val="accent1"/>
+              </a:lnRef>
+              <a:fillRef idx="0">
+                <a:schemeClr val="accent1"/>
+              </a:fillRef>
+              <a:effectRef idx="0">
+                <a:schemeClr val="accent1"/>
+              </a:effectRef>
+              <a:fontRef idx="minor">
+                <a:schemeClr val="tx1"/>
+              </a:fontRef>
+            </p:style>
+          </p:cxnSp>
+          <p:cxnSp>
+            <p:nvCxnSpPr>
+              <p:cNvPr id="15" name="Rechte verbindingslijn met pijl 14"/>
+              <p:cNvCxnSpPr>
+                <a:stCxn id="82" idx="1"/>
+                <a:endCxn id="19" idx="3"/>
+              </p:cNvCxnSpPr>
+              <p:nvPr/>
+            </p:nvCxnSpPr>
+            <p:spPr>
+              <a:xfrm flipH="1">
+                <a:off x="5940152" y="4267220"/>
+                <a:ext cx="504056" cy="0"/>
+              </a:xfrm>
+              <a:prstGeom prst="straightConnector1">
+                <a:avLst/>
+              </a:prstGeom>
+              <a:ln w="31750">
+                <a:headEnd w="lg" len="lg"/>
+                <a:tailEnd type="arrow" w="lg" len="lg"/>
+              </a:ln>
+            </p:spPr>
+            <p:style>
+              <a:lnRef idx="1">
+                <a:schemeClr val="accent1"/>
+              </a:lnRef>
+              <a:fillRef idx="0">
+                <a:schemeClr val="accent1"/>
+              </a:fillRef>
+              <a:effectRef idx="0">
+                <a:schemeClr val="accent1"/>
+              </a:effectRef>
+              <a:fontRef idx="minor">
+                <a:schemeClr val="tx1"/>
+              </a:fontRef>
+            </p:style>
+          </p:cxnSp>
+        </p:grpSp>
+      </p:grpSp>
     </p:spTree>
     <p:extLst>
       <p:ext uri="{BB962C8B-B14F-4D97-AF65-F5344CB8AC3E}">
@@ -3674,49 +3828,52 @@
       </p:grpSpPr>
       <p:grpSp>
         <p:nvGrpSpPr>
-          <p:cNvPr id="61" name="Groep 60"/>
+          <p:cNvPr id="11" name="Groep 10"/>
           <p:cNvGrpSpPr/>
           <p:nvPr/>
         </p:nvGrpSpPr>
         <p:grpSpPr>
           <a:xfrm>
-            <a:off x="6080548" y="4916579"/>
-            <a:ext cx="1735474" cy="937677"/>
-            <a:chOff x="6012160" y="4837018"/>
-            <a:chExt cx="1735474" cy="937677"/>
+            <a:off x="1454201" y="958486"/>
+            <a:ext cx="6268358" cy="5234395"/>
+            <a:chOff x="2402041" y="958486"/>
+            <a:chExt cx="6268358" cy="5234395"/>
           </a:xfrm>
         </p:grpSpPr>
         <p:grpSp>
           <p:nvGrpSpPr>
-            <p:cNvPr id="32" name="Groep 31"/>
+            <p:cNvPr id="3" name="Groep 2"/>
             <p:cNvGrpSpPr/>
             <p:nvPr/>
           </p:nvGrpSpPr>
           <p:grpSpPr>
             <a:xfrm>
-              <a:off x="6012160" y="5168513"/>
-              <a:ext cx="1584176" cy="276999"/>
-              <a:chOff x="6110655" y="5044534"/>
-              <a:chExt cx="1584176" cy="276999"/>
+              <a:off x="3387718" y="2366708"/>
+              <a:ext cx="4297005" cy="2211570"/>
+              <a:chOff x="3387718" y="2366708"/>
+              <a:chExt cx="4297005" cy="2211570"/>
             </a:xfrm>
           </p:grpSpPr>
           <p:cxnSp>
             <p:nvCxnSpPr>
-              <p:cNvPr id="33" name="Rechte verbindingslijn met pijl 32"/>
-              <p:cNvCxnSpPr/>
+              <p:cNvPr id="36" name="Gebogen verbindingslijn 35"/>
+              <p:cNvCxnSpPr>
+                <a:stCxn id="8" idx="2"/>
+                <a:endCxn id="4" idx="0"/>
+              </p:cNvCxnSpPr>
               <p:nvPr/>
             </p:nvCxnSpPr>
             <p:spPr>
-              <a:xfrm>
-                <a:off x="6110655" y="5187672"/>
-                <a:ext cx="470514" cy="0"/>
+              <a:xfrm rot="5400000">
+                <a:off x="4937508" y="2017579"/>
+                <a:ext cx="831326" cy="1529584"/>
               </a:xfrm>
-              <a:prstGeom prst="straightConnector1">
+              <a:prstGeom prst="bentConnector3">
                 <a:avLst/>
               </a:prstGeom>
               <a:ln w="31750">
                 <a:solidFill>
-                  <a:srgbClr val="7030A0"/>
+                  <a:srgbClr val="96329E"/>
                 </a:solidFill>
                 <a:headEnd w="lg" len="lg"/>
                 <a:tailEnd type="arrow" w="lg" len="lg"/>
@@ -3737,9 +3894,144 @@
               </a:fontRef>
             </p:style>
           </p:cxnSp>
+          <p:cxnSp>
+            <p:nvCxnSpPr>
+              <p:cNvPr id="38" name="Gebogen verbindingslijn 37"/>
+              <p:cNvCxnSpPr>
+                <a:stCxn id="8" idx="2"/>
+                <a:endCxn id="7" idx="0"/>
+              </p:cNvCxnSpPr>
+              <p:nvPr/>
+            </p:nvCxnSpPr>
+            <p:spPr>
+              <a:xfrm rot="16200000" flipH="1">
+                <a:off x="6485680" y="1998991"/>
+                <a:ext cx="831326" cy="1566760"/>
+              </a:xfrm>
+              <a:prstGeom prst="bentConnector3">
+                <a:avLst/>
+              </a:prstGeom>
+              <a:ln w="31750">
+                <a:solidFill>
+                  <a:srgbClr val="96329E"/>
+                </a:solidFill>
+                <a:headEnd w="lg" len="lg"/>
+                <a:tailEnd type="arrow" w="lg" len="lg"/>
+              </a:ln>
+            </p:spPr>
+            <p:style>
+              <a:lnRef idx="1">
+                <a:schemeClr val="accent1"/>
+              </a:lnRef>
+              <a:fillRef idx="0">
+                <a:schemeClr val="accent1"/>
+              </a:fillRef>
+              <a:effectRef idx="0">
+                <a:schemeClr val="accent1"/>
+              </a:effectRef>
+              <a:fontRef idx="minor">
+                <a:schemeClr val="tx1"/>
+              </a:fontRef>
+            </p:style>
+          </p:cxnSp>
+          <p:cxnSp>
+            <p:nvCxnSpPr>
+              <p:cNvPr id="40" name="Gebogen verbindingslijn 39"/>
+              <p:cNvCxnSpPr>
+                <a:stCxn id="4" idx="2"/>
+                <a:endCxn id="6" idx="0"/>
+              </p:cNvCxnSpPr>
+              <p:nvPr/>
+            </p:nvCxnSpPr>
+            <p:spPr>
+              <a:xfrm rot="5400000">
+                <a:off x="3497981" y="3487880"/>
+                <a:ext cx="980135" cy="1200662"/>
+              </a:xfrm>
+              <a:prstGeom prst="bentConnector3">
+                <a:avLst/>
+              </a:prstGeom>
+              <a:ln w="31750">
+                <a:solidFill>
+                  <a:srgbClr val="96329E"/>
+                </a:solidFill>
+                <a:headEnd w="lg" len="lg"/>
+                <a:tailEnd type="arrow" w="lg" len="lg"/>
+              </a:ln>
+            </p:spPr>
+            <p:style>
+              <a:lnRef idx="1">
+                <a:schemeClr val="accent1"/>
+              </a:lnRef>
+              <a:fillRef idx="0">
+                <a:schemeClr val="accent1"/>
+              </a:fillRef>
+              <a:effectRef idx="0">
+                <a:schemeClr val="accent1"/>
+              </a:effectRef>
+              <a:fontRef idx="minor">
+                <a:schemeClr val="tx1"/>
+              </a:fontRef>
+            </p:style>
+          </p:cxnSp>
+          <p:cxnSp>
+            <p:nvCxnSpPr>
+              <p:cNvPr id="42" name="Gebogen verbindingslijn 41"/>
+              <p:cNvCxnSpPr>
+                <a:stCxn id="4" idx="2"/>
+                <a:endCxn id="5" idx="0"/>
+              </p:cNvCxnSpPr>
+              <p:nvPr/>
+            </p:nvCxnSpPr>
+            <p:spPr>
+              <a:xfrm rot="16200000" flipH="1">
+                <a:off x="4708549" y="3477974"/>
+                <a:ext cx="980135" cy="1220474"/>
+              </a:xfrm>
+              <a:prstGeom prst="bentConnector3">
+                <a:avLst/>
+              </a:prstGeom>
+              <a:ln w="31750">
+                <a:solidFill>
+                  <a:srgbClr val="96329E"/>
+                </a:solidFill>
+                <a:headEnd w="lg" len="lg"/>
+                <a:tailEnd type="arrow" w="lg" len="lg"/>
+              </a:ln>
+            </p:spPr>
+            <p:style>
+              <a:lnRef idx="1">
+                <a:schemeClr val="accent1"/>
+              </a:lnRef>
+              <a:fillRef idx="0">
+                <a:schemeClr val="accent1"/>
+              </a:fillRef>
+              <a:effectRef idx="0">
+                <a:schemeClr val="accent1"/>
+              </a:effectRef>
+              <a:fontRef idx="minor">
+                <a:schemeClr val="tx1"/>
+              </a:fontRef>
+            </p:style>
+          </p:cxnSp>
+        </p:grpSp>
+        <p:grpSp>
+          <p:nvGrpSpPr>
+            <p:cNvPr id="10" name="Groep 9"/>
+            <p:cNvGrpSpPr/>
+            <p:nvPr/>
+          </p:nvGrpSpPr>
+          <p:grpSpPr>
+            <a:xfrm>
+              <a:off x="2402041" y="958486"/>
+              <a:ext cx="6268358" cy="5234395"/>
+              <a:chOff x="2402041" y="958486"/>
+              <a:chExt cx="6268358" cy="5234395"/>
+            </a:xfrm>
+          </p:grpSpPr>
           <p:sp>
             <p:nvSpPr>
-              <p:cNvPr id="34" name="Tekstvak 33"/>
+              <p:cNvPr id="4" name="Tekstvak 3"/>
               <p:cNvSpPr txBox="1">
                 <a:spLocks noChangeAspect="1"/>
               </p:cNvSpPr>
@@ -3747,19 +4039,21 @@
             </p:nvSpPr>
             <p:spPr>
               <a:xfrm>
-                <a:off x="6588224" y="5044534"/>
-                <a:ext cx="1106607" cy="276999"/>
+                <a:off x="3602703" y="3198034"/>
+                <a:ext cx="1971352" cy="400110"/>
               </a:xfrm>
               <a:prstGeom prst="rect">
                 <a:avLst/>
               </a:prstGeom>
               <a:noFill/>
               <a:ln>
-                <a:noFill/>
+                <a:solidFill>
+                  <a:schemeClr val="tx1"/>
+                </a:solidFill>
               </a:ln>
             </p:spPr>
             <p:txBody>
-              <a:bodyPr wrap="square" rtlCol="0" anchor="b" anchorCtr="0">
+              <a:bodyPr wrap="square" rtlCol="0" anchor="ctr" anchorCtr="1">
                 <a:spAutoFit/>
               </a:bodyPr>
               <a:lstStyle>
@@ -3774,67 +4068,17 @@
                 </a:lvl1pPr>
               </a:lstStyle>
               <a:p>
-                <a:pPr algn="l"/>
                 <a:r>
-                  <a:rPr lang="nl-BE" sz="1200" dirty="0" smtClean="0"/>
-                  <a:t>erft over van</a:t>
+                  <a:rPr lang="nl-BE" dirty="0" err="1"/>
+                  <a:t>AbstractPilot</a:t>
                 </a:r>
-                <a:endParaRPr lang="nl-BE" sz="1200" dirty="0"/>
+                <a:endParaRPr lang="nl-BE" dirty="0"/>
               </a:p>
             </p:txBody>
           </p:sp>
-        </p:grpSp>
-        <p:grpSp>
-          <p:nvGrpSpPr>
-            <p:cNvPr id="55" name="Groep 54"/>
-            <p:cNvGrpSpPr/>
-            <p:nvPr/>
-          </p:nvGrpSpPr>
-          <p:grpSpPr>
-            <a:xfrm>
-              <a:off x="6012160" y="4837018"/>
-              <a:ext cx="1735474" cy="276999"/>
-              <a:chOff x="6110655" y="5044534"/>
-              <a:chExt cx="1735474" cy="276999"/>
-            </a:xfrm>
-          </p:grpSpPr>
-          <p:cxnSp>
-            <p:nvCxnSpPr>
-              <p:cNvPr id="56" name="Rechte verbindingslijn met pijl 55"/>
-              <p:cNvCxnSpPr/>
-              <p:nvPr/>
-            </p:nvCxnSpPr>
-            <p:spPr>
-              <a:xfrm>
-                <a:off x="6110655" y="5187672"/>
-                <a:ext cx="470514" cy="0"/>
-              </a:xfrm>
-              <a:prstGeom prst="straightConnector1">
-                <a:avLst/>
-              </a:prstGeom>
-              <a:ln w="31750">
-                <a:headEnd w="lg" len="lg"/>
-                <a:tailEnd type="arrow" w="lg" len="lg"/>
-              </a:ln>
-            </p:spPr>
-            <p:style>
-              <a:lnRef idx="1">
-                <a:schemeClr val="accent1"/>
-              </a:lnRef>
-              <a:fillRef idx="0">
-                <a:schemeClr val="accent1"/>
-              </a:fillRef>
-              <a:effectRef idx="0">
-                <a:schemeClr val="accent1"/>
-              </a:effectRef>
-              <a:fontRef idx="minor">
-                <a:schemeClr val="tx1"/>
-              </a:fontRef>
-            </p:style>
-          </p:cxnSp>
           <p:sp>
             <p:nvSpPr>
-              <p:cNvPr id="57" name="Tekstvak 56"/>
+              <p:cNvPr id="5" name="Tekstvak 4"/>
               <p:cNvSpPr txBox="1">
                 <a:spLocks noChangeAspect="1"/>
               </p:cNvSpPr>
@@ -3842,19 +4086,21 @@
             </p:nvSpPr>
             <p:spPr>
               <a:xfrm>
-                <a:off x="6588224" y="5044534"/>
-                <a:ext cx="1257905" cy="276999"/>
+                <a:off x="4823177" y="4578279"/>
+                <a:ext cx="1971352" cy="400110"/>
               </a:xfrm>
               <a:prstGeom prst="rect">
                 <a:avLst/>
               </a:prstGeom>
               <a:noFill/>
               <a:ln>
-                <a:noFill/>
+                <a:solidFill>
+                  <a:schemeClr val="tx1"/>
+                </a:solidFill>
               </a:ln>
             </p:spPr>
             <p:txBody>
-              <a:bodyPr wrap="square" rtlCol="0" anchor="b" anchorCtr="0">
+              <a:bodyPr wrap="square" rtlCol="0" anchor="ctr" anchorCtr="1">
                 <a:spAutoFit/>
               </a:bodyPr>
               <a:lstStyle>
@@ -3869,72 +4115,17 @@
                 </a:lvl1pPr>
               </a:lstStyle>
               <a:p>
-                <a:pPr algn="l"/>
                 <a:r>
-                  <a:rPr lang="nl-BE" sz="1200" dirty="0" smtClean="0"/>
-                  <a:t>informatiestroom</a:t>
+                  <a:rPr lang="nl-BE" dirty="0" err="1"/>
+                  <a:t>SimulatorPilot</a:t>
                 </a:r>
-                <a:endParaRPr lang="nl-BE" sz="1200" dirty="0"/>
+                <a:endParaRPr lang="nl-BE" dirty="0"/>
               </a:p>
             </p:txBody>
           </p:sp>
-        </p:grpSp>
-        <p:grpSp>
-          <p:nvGrpSpPr>
-            <p:cNvPr id="58" name="Groep 57"/>
-            <p:cNvGrpSpPr/>
-            <p:nvPr/>
-          </p:nvGrpSpPr>
-          <p:grpSpPr>
-            <a:xfrm>
-              <a:off x="6012160" y="5497696"/>
-              <a:ext cx="1735474" cy="276999"/>
-              <a:chOff x="6110655" y="5044534"/>
-              <a:chExt cx="1735474" cy="276999"/>
-            </a:xfrm>
-          </p:grpSpPr>
-          <p:cxnSp>
-            <p:nvCxnSpPr>
-              <p:cNvPr id="59" name="Rechte verbindingslijn met pijl 58"/>
-              <p:cNvCxnSpPr/>
-              <p:nvPr/>
-            </p:nvCxnSpPr>
-            <p:spPr>
-              <a:xfrm>
-                <a:off x="6110655" y="5187672"/>
-                <a:ext cx="470514" cy="0"/>
-              </a:xfrm>
-              <a:prstGeom prst="straightConnector1">
-                <a:avLst/>
-              </a:prstGeom>
-              <a:ln w="31750">
-                <a:solidFill>
-                  <a:schemeClr val="accent3">
-                    <a:lumMod val="50000"/>
-                  </a:schemeClr>
-                </a:solidFill>
-                <a:headEnd w="lg" len="lg"/>
-                <a:tailEnd type="arrow" w="lg" len="lg"/>
-              </a:ln>
-            </p:spPr>
-            <p:style>
-              <a:lnRef idx="1">
-                <a:schemeClr val="accent1"/>
-              </a:lnRef>
-              <a:fillRef idx="0">
-                <a:schemeClr val="accent1"/>
-              </a:fillRef>
-              <a:effectRef idx="0">
-                <a:schemeClr val="accent1"/>
-              </a:effectRef>
-              <a:fontRef idx="minor">
-                <a:schemeClr val="tx1"/>
-              </a:fontRef>
-            </p:style>
-          </p:cxnSp>
           <p:sp>
             <p:nvSpPr>
-              <p:cNvPr id="60" name="Tekstvak 59"/>
+              <p:cNvPr id="6" name="Tekstvak 5"/>
               <p:cNvSpPr txBox="1">
                 <a:spLocks noChangeAspect="1"/>
               </p:cNvSpPr>
@@ -3942,19 +4133,21 @@
             </p:nvSpPr>
             <p:spPr>
               <a:xfrm>
-                <a:off x="6588224" y="5044534"/>
-                <a:ext cx="1257905" cy="276999"/>
+                <a:off x="2402041" y="4578279"/>
+                <a:ext cx="1971352" cy="400110"/>
               </a:xfrm>
               <a:prstGeom prst="rect">
                 <a:avLst/>
               </a:prstGeom>
               <a:noFill/>
               <a:ln>
-                <a:noFill/>
+                <a:solidFill>
+                  <a:schemeClr val="tx1"/>
+                </a:solidFill>
               </a:ln>
             </p:spPr>
             <p:txBody>
-              <a:bodyPr wrap="square" rtlCol="0" anchor="b" anchorCtr="0">
+              <a:bodyPr wrap="square" rtlCol="0" anchor="ctr" anchorCtr="1">
                 <a:spAutoFit/>
               </a:bodyPr>
               <a:lstStyle>
@@ -3969,598 +4162,292 @@
                 </a:lvl1pPr>
               </a:lstStyle>
               <a:p>
-                <a:pPr algn="l"/>
                 <a:r>
-                  <a:rPr lang="nl-BE" sz="1200" dirty="0" smtClean="0"/>
-                  <a:t>implementeert</a:t>
+                  <a:rPr lang="nl-BE" dirty="0" err="1"/>
+                  <a:t>RobotPilot</a:t>
                 </a:r>
-                <a:endParaRPr lang="nl-BE" sz="1200" dirty="0"/>
+                <a:endParaRPr lang="nl-BE" dirty="0"/>
+              </a:p>
+            </p:txBody>
+          </p:sp>
+          <p:sp>
+            <p:nvSpPr>
+              <p:cNvPr id="7" name="Tekstvak 6"/>
+              <p:cNvSpPr txBox="1">
+                <a:spLocks noChangeAspect="1"/>
+              </p:cNvSpPr>
+              <p:nvPr/>
+            </p:nvSpPr>
+            <p:spPr>
+              <a:xfrm>
+                <a:off x="6699047" y="3198034"/>
+                <a:ext cx="1971352" cy="400110"/>
+              </a:xfrm>
+              <a:prstGeom prst="rect">
+                <a:avLst/>
+              </a:prstGeom>
+              <a:noFill/>
+              <a:ln>
+                <a:solidFill>
+                  <a:schemeClr val="tx1"/>
+                </a:solidFill>
+              </a:ln>
+            </p:spPr>
+            <p:txBody>
+              <a:bodyPr wrap="square" rtlCol="0" anchor="ctr" anchorCtr="1">
+                <a:spAutoFit/>
+              </a:bodyPr>
+              <a:lstStyle>
+                <a:defPPr>
+                  <a:defRPr lang="nl-BE"/>
+                </a:defPPr>
+                <a:lvl1pPr algn="ctr">
+                  <a:defRPr sz="2000">
+                    <a:latin typeface="Times New Roman" pitchFamily="18" charset="0"/>
+                    <a:cs typeface="Times New Roman" pitchFamily="18" charset="0"/>
+                  </a:defRPr>
+                </a:lvl1pPr>
+              </a:lstStyle>
+              <a:p>
+                <a:r>
+                  <a:rPr lang="nl-BE" dirty="0" err="1"/>
+                  <a:t>DummyPilot</a:t>
+                </a:r>
+                <a:endParaRPr lang="nl-BE" dirty="0"/>
+              </a:p>
+            </p:txBody>
+          </p:sp>
+          <p:sp>
+            <p:nvSpPr>
+              <p:cNvPr id="8" name="Tekstvak 7"/>
+              <p:cNvSpPr txBox="1">
+                <a:spLocks noChangeAspect="1"/>
+              </p:cNvSpPr>
+              <p:nvPr/>
+            </p:nvSpPr>
+            <p:spPr>
+              <a:xfrm>
+                <a:off x="5132287" y="1966598"/>
+                <a:ext cx="1971352" cy="400110"/>
+              </a:xfrm>
+              <a:prstGeom prst="rect">
+                <a:avLst/>
+              </a:prstGeom>
+              <a:noFill/>
+              <a:ln>
+                <a:solidFill>
+                  <a:schemeClr val="tx1"/>
+                </a:solidFill>
+              </a:ln>
+            </p:spPr>
+            <p:txBody>
+              <a:bodyPr wrap="square" rtlCol="0" anchor="ctr" anchorCtr="1">
+                <a:spAutoFit/>
+              </a:bodyPr>
+              <a:lstStyle>
+                <a:defPPr>
+                  <a:defRPr lang="nl-BE"/>
+                </a:defPPr>
+                <a:lvl1pPr algn="ctr">
+                  <a:defRPr sz="2000">
+                    <a:latin typeface="Times New Roman" pitchFamily="18" charset="0"/>
+                    <a:cs typeface="Times New Roman" pitchFamily="18" charset="0"/>
+                  </a:defRPr>
+                </a:lvl1pPr>
+              </a:lstStyle>
+              <a:p>
+                <a:r>
+                  <a:rPr lang="nl-BE" i="1" dirty="0" err="1" smtClean="0"/>
+                  <a:t>PilotInterface</a:t>
+                </a:r>
+                <a:endParaRPr lang="nl-BE" i="1" dirty="0"/>
+              </a:p>
+            </p:txBody>
+          </p:sp>
+          <p:sp>
+            <p:nvSpPr>
+              <p:cNvPr id="14" name="Tekstvak 13"/>
+              <p:cNvSpPr txBox="1">
+                <a:spLocks noChangeAspect="1"/>
+              </p:cNvSpPr>
+              <p:nvPr/>
+            </p:nvSpPr>
+            <p:spPr>
+              <a:xfrm>
+                <a:off x="2402041" y="5792771"/>
+                <a:ext cx="1971352" cy="400110"/>
+              </a:xfrm>
+              <a:prstGeom prst="rect">
+                <a:avLst/>
+              </a:prstGeom>
+              <a:noFill/>
+              <a:ln>
+                <a:solidFill>
+                  <a:schemeClr val="tx1"/>
+                </a:solidFill>
+              </a:ln>
+            </p:spPr>
+            <p:txBody>
+              <a:bodyPr wrap="square" rtlCol="0" anchor="ctr" anchorCtr="1">
+                <a:spAutoFit/>
+              </a:bodyPr>
+              <a:lstStyle>
+                <a:defPPr>
+                  <a:defRPr lang="nl-BE"/>
+                </a:defPPr>
+                <a:lvl1pPr algn="ctr">
+                  <a:defRPr sz="2000">
+                    <a:latin typeface="Times New Roman" pitchFamily="18" charset="0"/>
+                    <a:cs typeface="Times New Roman" pitchFamily="18" charset="0"/>
+                  </a:defRPr>
+                </a:lvl1pPr>
+              </a:lstStyle>
+              <a:p>
+                <a:r>
+                  <a:rPr lang="nl-BE" dirty="0" smtClean="0"/>
+                  <a:t>…</a:t>
+                </a:r>
+                <a:endParaRPr lang="nl-BE" dirty="0"/>
+              </a:p>
+            </p:txBody>
+          </p:sp>
+          <p:sp>
+            <p:nvSpPr>
+              <p:cNvPr id="62" name="Tekstvak 61"/>
+              <p:cNvSpPr txBox="1">
+                <a:spLocks noChangeAspect="1"/>
+              </p:cNvSpPr>
+              <p:nvPr/>
+            </p:nvSpPr>
+            <p:spPr>
+              <a:xfrm>
+                <a:off x="5132288" y="958486"/>
+                <a:ext cx="1971352" cy="400110"/>
+              </a:xfrm>
+              <a:prstGeom prst="rect">
+                <a:avLst/>
+              </a:prstGeom>
+              <a:noFill/>
+              <a:ln>
+                <a:solidFill>
+                  <a:schemeClr val="tx1"/>
+                </a:solidFill>
+              </a:ln>
+            </p:spPr>
+            <p:txBody>
+              <a:bodyPr wrap="square" rtlCol="0" anchor="ctr" anchorCtr="1">
+                <a:spAutoFit/>
+              </a:bodyPr>
+              <a:lstStyle>
+                <a:defPPr>
+                  <a:defRPr lang="nl-BE"/>
+                </a:defPPr>
+                <a:lvl1pPr algn="ctr">
+                  <a:defRPr sz="2000">
+                    <a:latin typeface="Times New Roman" pitchFamily="18" charset="0"/>
+                    <a:cs typeface="Times New Roman" pitchFamily="18" charset="0"/>
+                  </a:defRPr>
+                </a:lvl1pPr>
+              </a:lstStyle>
+              <a:p>
+                <a:r>
+                  <a:rPr lang="nl-BE" dirty="0" smtClean="0"/>
+                  <a:t>…</a:t>
+                </a:r>
+                <a:endParaRPr lang="nl-BE" dirty="0"/>
               </a:p>
             </p:txBody>
           </p:sp>
         </p:grpSp>
-      </p:grpSp>
-      <p:grpSp>
-        <p:nvGrpSpPr>
-          <p:cNvPr id="68" name="Groep 67"/>
-          <p:cNvGrpSpPr/>
-          <p:nvPr/>
-        </p:nvGrpSpPr>
-        <p:grpSpPr>
-          <a:xfrm>
-            <a:off x="1547664" y="619861"/>
-            <a:ext cx="6268358" cy="5234395"/>
-            <a:chOff x="1481714" y="188640"/>
-            <a:chExt cx="6268358" cy="5234395"/>
-          </a:xfrm>
-        </p:grpSpPr>
-        <p:sp>
-          <p:nvSpPr>
-            <p:cNvPr id="4" name="Tekstvak 3"/>
-            <p:cNvSpPr txBox="1">
-              <a:spLocks noChangeAspect="1"/>
-            </p:cNvSpPr>
+        <p:grpSp>
+          <p:nvGrpSpPr>
+            <p:cNvPr id="9" name="Groep 8"/>
+            <p:cNvGrpSpPr/>
             <p:nvPr/>
-          </p:nvSpPr>
-          <p:spPr>
+          </p:nvGrpSpPr>
+          <p:grpSpPr>
             <a:xfrm>
-              <a:off x="2682376" y="2428188"/>
-              <a:ext cx="1971352" cy="400110"/>
+              <a:off x="3387717" y="1358596"/>
+              <a:ext cx="2730247" cy="4434175"/>
+              <a:chOff x="3387717" y="1358596"/>
+              <a:chExt cx="2730247" cy="4434175"/>
             </a:xfrm>
-            <a:prstGeom prst="rect">
-              <a:avLst/>
-            </a:prstGeom>
-            <a:noFill/>
-            <a:ln>
-              <a:solidFill>
+          </p:grpSpPr>
+          <p:cxnSp>
+            <p:nvCxnSpPr>
+              <p:cNvPr id="54" name="Rechte verbindingslijn met pijl 53"/>
+              <p:cNvCxnSpPr>
+                <a:stCxn id="6" idx="2"/>
+                <a:endCxn id="14" idx="0"/>
+              </p:cNvCxnSpPr>
+              <p:nvPr/>
+            </p:nvCxnSpPr>
+            <p:spPr>
+              <a:xfrm>
+                <a:off x="3387717" y="4978389"/>
+                <a:ext cx="0" cy="814382"/>
+              </a:xfrm>
+              <a:prstGeom prst="straightConnector1">
+                <a:avLst/>
+              </a:prstGeom>
+              <a:ln w="31750">
+                <a:headEnd w="lg" len="lg"/>
+                <a:tailEnd type="arrow" w="lg" len="lg"/>
+              </a:ln>
+            </p:spPr>
+            <p:style>
+              <a:lnRef idx="1">
+                <a:schemeClr val="accent1"/>
+              </a:lnRef>
+              <a:fillRef idx="0">
+                <a:schemeClr val="accent1"/>
+              </a:fillRef>
+              <a:effectRef idx="0">
+                <a:schemeClr val="accent1"/>
+              </a:effectRef>
+              <a:fontRef idx="minor">
                 <a:schemeClr val="tx1"/>
-              </a:solidFill>
-            </a:ln>
-          </p:spPr>
-          <p:txBody>
-            <a:bodyPr wrap="square" rtlCol="0" anchor="ctr" anchorCtr="1">
-              <a:spAutoFit/>
-            </a:bodyPr>
-            <a:lstStyle>
-              <a:defPPr>
-                <a:defRPr lang="nl-BE"/>
-              </a:defPPr>
-              <a:lvl1pPr algn="ctr">
-                <a:defRPr sz="2000">
-                  <a:latin typeface="Times New Roman" pitchFamily="18" charset="0"/>
-                  <a:cs typeface="Times New Roman" pitchFamily="18" charset="0"/>
-                </a:defRPr>
-              </a:lvl1pPr>
-            </a:lstStyle>
-            <a:p>
-              <a:r>
-                <a:rPr lang="nl-BE" dirty="0" err="1"/>
-                <a:t>AbstractPilot</a:t>
-              </a:r>
-              <a:endParaRPr lang="nl-BE" dirty="0"/>
-            </a:p>
-          </p:txBody>
-        </p:sp>
-        <p:sp>
-          <p:nvSpPr>
-            <p:cNvPr id="5" name="Tekstvak 4"/>
-            <p:cNvSpPr txBox="1">
-              <a:spLocks noChangeAspect="1"/>
-            </p:cNvSpPr>
-            <p:nvPr/>
-          </p:nvSpPr>
-          <p:spPr>
-            <a:xfrm>
-              <a:off x="3902850" y="3808433"/>
-              <a:ext cx="1971352" cy="400110"/>
-            </a:xfrm>
-            <a:prstGeom prst="rect">
-              <a:avLst/>
-            </a:prstGeom>
-            <a:noFill/>
-            <a:ln>
-              <a:solidFill>
+              </a:fontRef>
+            </p:style>
+          </p:cxnSp>
+          <p:cxnSp>
+            <p:nvCxnSpPr>
+              <p:cNvPr id="63" name="Rechte verbindingslijn met pijl 62"/>
+              <p:cNvCxnSpPr>
+                <a:stCxn id="8" idx="0"/>
+                <a:endCxn id="62" idx="2"/>
+              </p:cNvCxnSpPr>
+              <p:nvPr/>
+            </p:nvCxnSpPr>
+            <p:spPr>
+              <a:xfrm flipV="1">
+                <a:off x="6117963" y="1358596"/>
+                <a:ext cx="1" cy="608002"/>
+              </a:xfrm>
+              <a:prstGeom prst="straightConnector1">
+                <a:avLst/>
+              </a:prstGeom>
+              <a:ln w="31750">
+                <a:headEnd w="lg" len="lg"/>
+                <a:tailEnd type="arrow" w="lg" len="lg"/>
+              </a:ln>
+            </p:spPr>
+            <p:style>
+              <a:lnRef idx="1">
+                <a:schemeClr val="accent1"/>
+              </a:lnRef>
+              <a:fillRef idx="0">
+                <a:schemeClr val="accent1"/>
+              </a:fillRef>
+              <a:effectRef idx="0">
+                <a:schemeClr val="accent1"/>
+              </a:effectRef>
+              <a:fontRef idx="minor">
                 <a:schemeClr val="tx1"/>
-              </a:solidFill>
-            </a:ln>
-          </p:spPr>
-          <p:txBody>
-            <a:bodyPr wrap="square" rtlCol="0" anchor="ctr" anchorCtr="1">
-              <a:spAutoFit/>
-            </a:bodyPr>
-            <a:lstStyle>
-              <a:defPPr>
-                <a:defRPr lang="nl-BE"/>
-              </a:defPPr>
-              <a:lvl1pPr algn="ctr">
-                <a:defRPr sz="2000">
-                  <a:latin typeface="Times New Roman" pitchFamily="18" charset="0"/>
-                  <a:cs typeface="Times New Roman" pitchFamily="18" charset="0"/>
-                </a:defRPr>
-              </a:lvl1pPr>
-            </a:lstStyle>
-            <a:p>
-              <a:r>
-                <a:rPr lang="nl-BE" dirty="0" err="1"/>
-                <a:t>SimulatorPilot</a:t>
-              </a:r>
-              <a:endParaRPr lang="nl-BE" dirty="0"/>
-            </a:p>
-          </p:txBody>
-        </p:sp>
-        <p:sp>
-          <p:nvSpPr>
-            <p:cNvPr id="6" name="Tekstvak 5"/>
-            <p:cNvSpPr txBox="1">
-              <a:spLocks noChangeAspect="1"/>
-            </p:cNvSpPr>
-            <p:nvPr/>
-          </p:nvSpPr>
-          <p:spPr>
-            <a:xfrm>
-              <a:off x="1481714" y="3808433"/>
-              <a:ext cx="1971352" cy="400110"/>
-            </a:xfrm>
-            <a:prstGeom prst="rect">
-              <a:avLst/>
-            </a:prstGeom>
-            <a:noFill/>
-            <a:ln>
-              <a:solidFill>
-                <a:schemeClr val="tx1"/>
-              </a:solidFill>
-            </a:ln>
-          </p:spPr>
-          <p:txBody>
-            <a:bodyPr wrap="square" rtlCol="0" anchor="ctr" anchorCtr="1">
-              <a:spAutoFit/>
-            </a:bodyPr>
-            <a:lstStyle>
-              <a:defPPr>
-                <a:defRPr lang="nl-BE"/>
-              </a:defPPr>
-              <a:lvl1pPr algn="ctr">
-                <a:defRPr sz="2000">
-                  <a:latin typeface="Times New Roman" pitchFamily="18" charset="0"/>
-                  <a:cs typeface="Times New Roman" pitchFamily="18" charset="0"/>
-                </a:defRPr>
-              </a:lvl1pPr>
-            </a:lstStyle>
-            <a:p>
-              <a:r>
-                <a:rPr lang="nl-BE" dirty="0" err="1"/>
-                <a:t>RobotPilot</a:t>
-              </a:r>
-              <a:endParaRPr lang="nl-BE" dirty="0"/>
-            </a:p>
-          </p:txBody>
-        </p:sp>
-        <p:sp>
-          <p:nvSpPr>
-            <p:cNvPr id="7" name="Tekstvak 6"/>
-            <p:cNvSpPr txBox="1">
-              <a:spLocks noChangeAspect="1"/>
-            </p:cNvSpPr>
-            <p:nvPr/>
-          </p:nvSpPr>
-          <p:spPr>
-            <a:xfrm>
-              <a:off x="5778720" y="2428188"/>
-              <a:ext cx="1971352" cy="400110"/>
-            </a:xfrm>
-            <a:prstGeom prst="rect">
-              <a:avLst/>
-            </a:prstGeom>
-            <a:noFill/>
-            <a:ln>
-              <a:solidFill>
-                <a:schemeClr val="tx1"/>
-              </a:solidFill>
-            </a:ln>
-          </p:spPr>
-          <p:txBody>
-            <a:bodyPr wrap="square" rtlCol="0" anchor="ctr" anchorCtr="1">
-              <a:spAutoFit/>
-            </a:bodyPr>
-            <a:lstStyle>
-              <a:defPPr>
-                <a:defRPr lang="nl-BE"/>
-              </a:defPPr>
-              <a:lvl1pPr algn="ctr">
-                <a:defRPr sz="2000">
-                  <a:latin typeface="Times New Roman" pitchFamily="18" charset="0"/>
-                  <a:cs typeface="Times New Roman" pitchFamily="18" charset="0"/>
-                </a:defRPr>
-              </a:lvl1pPr>
-            </a:lstStyle>
-            <a:p>
-              <a:r>
-                <a:rPr lang="nl-BE" dirty="0" err="1"/>
-                <a:t>DummyPilot</a:t>
-              </a:r>
-              <a:endParaRPr lang="nl-BE" dirty="0"/>
-            </a:p>
-          </p:txBody>
-        </p:sp>
-        <p:sp>
-          <p:nvSpPr>
-            <p:cNvPr id="8" name="Tekstvak 7"/>
-            <p:cNvSpPr txBox="1">
-              <a:spLocks noChangeAspect="1"/>
-            </p:cNvSpPr>
-            <p:nvPr/>
-          </p:nvSpPr>
-          <p:spPr>
-            <a:xfrm>
-              <a:off x="4211960" y="1196752"/>
-              <a:ext cx="1971352" cy="400110"/>
-            </a:xfrm>
-            <a:prstGeom prst="rect">
-              <a:avLst/>
-            </a:prstGeom>
-            <a:noFill/>
-            <a:ln>
-              <a:solidFill>
-                <a:schemeClr val="tx1"/>
-              </a:solidFill>
-            </a:ln>
-          </p:spPr>
-          <p:txBody>
-            <a:bodyPr wrap="square" rtlCol="0" anchor="ctr" anchorCtr="1">
-              <a:spAutoFit/>
-            </a:bodyPr>
-            <a:lstStyle>
-              <a:defPPr>
-                <a:defRPr lang="nl-BE"/>
-              </a:defPPr>
-              <a:lvl1pPr algn="ctr">
-                <a:defRPr sz="2000">
-                  <a:latin typeface="Times New Roman" pitchFamily="18" charset="0"/>
-                  <a:cs typeface="Times New Roman" pitchFamily="18" charset="0"/>
-                </a:defRPr>
-              </a:lvl1pPr>
-            </a:lstStyle>
-            <a:p>
-              <a:r>
-                <a:rPr lang="nl-BE" i="1" dirty="0" err="1" smtClean="0"/>
-                <a:t>PilotInterface</a:t>
-              </a:r>
-              <a:endParaRPr lang="nl-BE" i="1" dirty="0"/>
-            </a:p>
-          </p:txBody>
-        </p:sp>
-        <p:sp>
-          <p:nvSpPr>
-            <p:cNvPr id="14" name="Tekstvak 13"/>
-            <p:cNvSpPr txBox="1">
-              <a:spLocks noChangeAspect="1"/>
-            </p:cNvSpPr>
-            <p:nvPr/>
-          </p:nvSpPr>
-          <p:spPr>
-            <a:xfrm>
-              <a:off x="1481714" y="5022925"/>
-              <a:ext cx="1971352" cy="400110"/>
-            </a:xfrm>
-            <a:prstGeom prst="rect">
-              <a:avLst/>
-            </a:prstGeom>
-            <a:noFill/>
-            <a:ln>
-              <a:solidFill>
-                <a:schemeClr val="tx1"/>
-              </a:solidFill>
-            </a:ln>
-          </p:spPr>
-          <p:txBody>
-            <a:bodyPr wrap="square" rtlCol="0" anchor="ctr" anchorCtr="1">
-              <a:spAutoFit/>
-            </a:bodyPr>
-            <a:lstStyle>
-              <a:defPPr>
-                <a:defRPr lang="nl-BE"/>
-              </a:defPPr>
-              <a:lvl1pPr algn="ctr">
-                <a:defRPr sz="2000">
-                  <a:latin typeface="Times New Roman" pitchFamily="18" charset="0"/>
-                  <a:cs typeface="Times New Roman" pitchFamily="18" charset="0"/>
-                </a:defRPr>
-              </a:lvl1pPr>
-            </a:lstStyle>
-            <a:p>
-              <a:r>
-                <a:rPr lang="nl-BE" dirty="0" smtClean="0"/>
-                <a:t>…</a:t>
-              </a:r>
-              <a:endParaRPr lang="nl-BE" dirty="0"/>
-            </a:p>
-          </p:txBody>
-        </p:sp>
-        <p:cxnSp>
-          <p:nvCxnSpPr>
-            <p:cNvPr id="36" name="Gebogen verbindingslijn 35"/>
-            <p:cNvCxnSpPr>
-              <a:stCxn id="8" idx="2"/>
-              <a:endCxn id="4" idx="0"/>
-            </p:cNvCxnSpPr>
-            <p:nvPr/>
-          </p:nvCxnSpPr>
-          <p:spPr>
-            <a:xfrm rot="5400000">
-              <a:off x="4017181" y="1247733"/>
-              <a:ext cx="831326" cy="1529584"/>
-            </a:xfrm>
-            <a:prstGeom prst="bentConnector3">
-              <a:avLst/>
-            </a:prstGeom>
-            <a:ln w="31750">
-              <a:solidFill>
-                <a:schemeClr val="accent3">
-                  <a:lumMod val="50000"/>
-                </a:schemeClr>
-              </a:solidFill>
-              <a:headEnd w="lg" len="lg"/>
-              <a:tailEnd type="arrow" w="lg" len="lg"/>
-            </a:ln>
-          </p:spPr>
-          <p:style>
-            <a:lnRef idx="1">
-              <a:schemeClr val="accent1"/>
-            </a:lnRef>
-            <a:fillRef idx="0">
-              <a:schemeClr val="accent1"/>
-            </a:fillRef>
-            <a:effectRef idx="0">
-              <a:schemeClr val="accent1"/>
-            </a:effectRef>
-            <a:fontRef idx="minor">
-              <a:schemeClr val="tx1"/>
-            </a:fontRef>
-          </p:style>
-        </p:cxnSp>
-        <p:cxnSp>
-          <p:nvCxnSpPr>
-            <p:cNvPr id="38" name="Gebogen verbindingslijn 37"/>
-            <p:cNvCxnSpPr>
-              <a:stCxn id="8" idx="2"/>
-              <a:endCxn id="7" idx="0"/>
-            </p:cNvCxnSpPr>
-            <p:nvPr/>
-          </p:nvCxnSpPr>
-          <p:spPr>
-            <a:xfrm rot="16200000" flipH="1">
-              <a:off x="5565353" y="1229145"/>
-              <a:ext cx="831326" cy="1566760"/>
-            </a:xfrm>
-            <a:prstGeom prst="bentConnector3">
-              <a:avLst/>
-            </a:prstGeom>
-            <a:ln w="31750">
-              <a:solidFill>
-                <a:schemeClr val="accent3">
-                  <a:lumMod val="50000"/>
-                </a:schemeClr>
-              </a:solidFill>
-              <a:headEnd w="lg" len="lg"/>
-              <a:tailEnd type="arrow" w="lg" len="lg"/>
-            </a:ln>
-          </p:spPr>
-          <p:style>
-            <a:lnRef idx="1">
-              <a:schemeClr val="accent1"/>
-            </a:lnRef>
-            <a:fillRef idx="0">
-              <a:schemeClr val="accent1"/>
-            </a:fillRef>
-            <a:effectRef idx="0">
-              <a:schemeClr val="accent1"/>
-            </a:effectRef>
-            <a:fontRef idx="minor">
-              <a:schemeClr val="tx1"/>
-            </a:fontRef>
-          </p:style>
-        </p:cxnSp>
-        <p:cxnSp>
-          <p:nvCxnSpPr>
-            <p:cNvPr id="40" name="Gebogen verbindingslijn 39"/>
-            <p:cNvCxnSpPr>
-              <a:stCxn id="4" idx="2"/>
-              <a:endCxn id="6" idx="0"/>
-            </p:cNvCxnSpPr>
-            <p:nvPr/>
-          </p:nvCxnSpPr>
-          <p:spPr>
-            <a:xfrm rot="5400000">
-              <a:off x="2577654" y="2718034"/>
-              <a:ext cx="980135" cy="1200662"/>
-            </a:xfrm>
-            <a:prstGeom prst="bentConnector3">
-              <a:avLst/>
-            </a:prstGeom>
-            <a:ln w="31750">
-              <a:solidFill>
-                <a:srgbClr val="7030A0"/>
-              </a:solidFill>
-              <a:headEnd w="lg" len="lg"/>
-              <a:tailEnd type="arrow" w="lg" len="lg"/>
-            </a:ln>
-          </p:spPr>
-          <p:style>
-            <a:lnRef idx="1">
-              <a:schemeClr val="accent1"/>
-            </a:lnRef>
-            <a:fillRef idx="0">
-              <a:schemeClr val="accent1"/>
-            </a:fillRef>
-            <a:effectRef idx="0">
-              <a:schemeClr val="accent1"/>
-            </a:effectRef>
-            <a:fontRef idx="minor">
-              <a:schemeClr val="tx1"/>
-            </a:fontRef>
-          </p:style>
-        </p:cxnSp>
-        <p:cxnSp>
-          <p:nvCxnSpPr>
-            <p:cNvPr id="42" name="Gebogen verbindingslijn 41"/>
-            <p:cNvCxnSpPr>
-              <a:stCxn id="4" idx="2"/>
-              <a:endCxn id="5" idx="0"/>
-            </p:cNvCxnSpPr>
-            <p:nvPr/>
-          </p:nvCxnSpPr>
-          <p:spPr>
-            <a:xfrm rot="16200000" flipH="1">
-              <a:off x="3788222" y="2708128"/>
-              <a:ext cx="980135" cy="1220474"/>
-            </a:xfrm>
-            <a:prstGeom prst="bentConnector3">
-              <a:avLst/>
-            </a:prstGeom>
-            <a:ln w="31750">
-              <a:solidFill>
-                <a:srgbClr val="7030A0"/>
-              </a:solidFill>
-              <a:headEnd w="lg" len="lg"/>
-              <a:tailEnd type="arrow" w="lg" len="lg"/>
-            </a:ln>
-          </p:spPr>
-          <p:style>
-            <a:lnRef idx="1">
-              <a:schemeClr val="accent1"/>
-            </a:lnRef>
-            <a:fillRef idx="0">
-              <a:schemeClr val="accent1"/>
-            </a:fillRef>
-            <a:effectRef idx="0">
-              <a:schemeClr val="accent1"/>
-            </a:effectRef>
-            <a:fontRef idx="minor">
-              <a:schemeClr val="tx1"/>
-            </a:fontRef>
-          </p:style>
-        </p:cxnSp>
-        <p:cxnSp>
-          <p:nvCxnSpPr>
-            <p:cNvPr id="54" name="Rechte verbindingslijn met pijl 53"/>
-            <p:cNvCxnSpPr>
-              <a:stCxn id="6" idx="2"/>
-              <a:endCxn id="14" idx="0"/>
-            </p:cNvCxnSpPr>
-            <p:nvPr/>
-          </p:nvCxnSpPr>
-          <p:spPr>
-            <a:xfrm>
-              <a:off x="2467390" y="4208543"/>
-              <a:ext cx="0" cy="814382"/>
-            </a:xfrm>
-            <a:prstGeom prst="straightConnector1">
-              <a:avLst/>
-            </a:prstGeom>
-            <a:ln w="31750">
-              <a:headEnd w="lg" len="lg"/>
-              <a:tailEnd type="arrow" w="lg" len="lg"/>
-            </a:ln>
-          </p:spPr>
-          <p:style>
-            <a:lnRef idx="1">
-              <a:schemeClr val="accent1"/>
-            </a:lnRef>
-            <a:fillRef idx="0">
-              <a:schemeClr val="accent1"/>
-            </a:fillRef>
-            <a:effectRef idx="0">
-              <a:schemeClr val="accent1"/>
-            </a:effectRef>
-            <a:fontRef idx="minor">
-              <a:schemeClr val="tx1"/>
-            </a:fontRef>
-          </p:style>
-        </p:cxnSp>
-        <p:sp>
-          <p:nvSpPr>
-            <p:cNvPr id="62" name="Tekstvak 61"/>
-            <p:cNvSpPr txBox="1">
-              <a:spLocks noChangeAspect="1"/>
-            </p:cNvSpPr>
-            <p:nvPr/>
-          </p:nvSpPr>
-          <p:spPr>
-            <a:xfrm>
-              <a:off x="4211961" y="188640"/>
-              <a:ext cx="1971352" cy="400110"/>
-            </a:xfrm>
-            <a:prstGeom prst="rect">
-              <a:avLst/>
-            </a:prstGeom>
-            <a:noFill/>
-            <a:ln>
-              <a:solidFill>
-                <a:schemeClr val="tx1"/>
-              </a:solidFill>
-            </a:ln>
-          </p:spPr>
-          <p:txBody>
-            <a:bodyPr wrap="square" rtlCol="0" anchor="ctr" anchorCtr="1">
-              <a:spAutoFit/>
-            </a:bodyPr>
-            <a:lstStyle>
-              <a:defPPr>
-                <a:defRPr lang="nl-BE"/>
-              </a:defPPr>
-              <a:lvl1pPr algn="ctr">
-                <a:defRPr sz="2000">
-                  <a:latin typeface="Times New Roman" pitchFamily="18" charset="0"/>
-                  <a:cs typeface="Times New Roman" pitchFamily="18" charset="0"/>
-                </a:defRPr>
-              </a:lvl1pPr>
-            </a:lstStyle>
-            <a:p>
-              <a:r>
-                <a:rPr lang="nl-BE" dirty="0" smtClean="0"/>
-                <a:t>…</a:t>
-              </a:r>
-              <a:endParaRPr lang="nl-BE" dirty="0"/>
-            </a:p>
-          </p:txBody>
-        </p:sp>
-        <p:cxnSp>
-          <p:nvCxnSpPr>
-            <p:cNvPr id="63" name="Rechte verbindingslijn met pijl 62"/>
-            <p:cNvCxnSpPr>
-              <a:stCxn id="8" idx="0"/>
-              <a:endCxn id="62" idx="2"/>
-            </p:cNvCxnSpPr>
-            <p:nvPr/>
-          </p:nvCxnSpPr>
-          <p:spPr>
-            <a:xfrm flipV="1">
-              <a:off x="5197636" y="588750"/>
-              <a:ext cx="1" cy="608002"/>
-            </a:xfrm>
-            <a:prstGeom prst="straightConnector1">
-              <a:avLst/>
-            </a:prstGeom>
-            <a:ln w="31750">
-              <a:headEnd w="lg" len="lg"/>
-              <a:tailEnd type="arrow" w="lg" len="lg"/>
-            </a:ln>
-          </p:spPr>
-          <p:style>
-            <a:lnRef idx="1">
-              <a:schemeClr val="accent1"/>
-            </a:lnRef>
-            <a:fillRef idx="0">
-              <a:schemeClr val="accent1"/>
-            </a:fillRef>
-            <a:effectRef idx="0">
-              <a:schemeClr val="accent1"/>
-            </a:effectRef>
-            <a:fontRef idx="minor">
-              <a:schemeClr val="tx1"/>
-            </a:fontRef>
-          </p:style>
-        </p:cxnSp>
+              </a:fontRef>
+            </p:style>
+          </p:cxnSp>
+        </p:grpSp>
       </p:grpSp>
     </p:spTree>
     <p:extLst>
@@ -4592,613 +4479,800 @@
           <a:chExt cx="0" cy="0"/>
         </a:xfrm>
       </p:grpSpPr>
-      <p:sp>
-        <p:nvSpPr>
-          <p:cNvPr id="4" name="Tekstvak 3"/>
-          <p:cNvSpPr txBox="1">
-            <a:spLocks noChangeAspect="1"/>
-          </p:cNvSpPr>
-          <p:nvPr/>
-        </p:nvSpPr>
-        <p:spPr>
-          <a:xfrm>
-            <a:off x="1691680" y="1779166"/>
-            <a:ext cx="2347779" cy="400110"/>
-          </a:xfrm>
-          <a:prstGeom prst="rect">
-            <a:avLst/>
-          </a:prstGeom>
-          <a:noFill/>
-          <a:ln>
-            <a:solidFill>
-              <a:schemeClr val="tx1"/>
-            </a:solidFill>
-          </a:ln>
-        </p:spPr>
-        <p:txBody>
-          <a:bodyPr wrap="square" rtlCol="0" anchor="ctr" anchorCtr="1">
-            <a:spAutoFit/>
-          </a:bodyPr>
-          <a:lstStyle>
-            <a:defPPr>
-              <a:defRPr lang="nl-BE"/>
-            </a:defPPr>
-            <a:lvl1pPr algn="ctr">
-              <a:defRPr sz="2000">
-                <a:latin typeface="Times New Roman" pitchFamily="18" charset="0"/>
-                <a:cs typeface="Times New Roman" pitchFamily="18" charset="0"/>
-              </a:defRPr>
-            </a:lvl1pPr>
-          </a:lstStyle>
-          <a:p>
-            <a:r>
-              <a:rPr lang="nl-BE" dirty="0" err="1"/>
-              <a:t>RobotPilot</a:t>
-            </a:r>
-            <a:endParaRPr lang="nl-BE" dirty="0"/>
-          </a:p>
-        </p:txBody>
-      </p:sp>
-      <p:sp>
-        <p:nvSpPr>
-          <p:cNvPr id="5" name="Tekstvak 4"/>
-          <p:cNvSpPr txBox="1">
-            <a:spLocks noChangeAspect="1"/>
-          </p:cNvSpPr>
-          <p:nvPr/>
-        </p:nvSpPr>
-        <p:spPr>
-          <a:xfrm>
-            <a:off x="1691679" y="3503860"/>
-            <a:ext cx="2347780" cy="400110"/>
-          </a:xfrm>
-          <a:prstGeom prst="rect">
-            <a:avLst/>
-          </a:prstGeom>
-          <a:noFill/>
-          <a:ln>
-            <a:solidFill>
-              <a:schemeClr val="tx1"/>
-            </a:solidFill>
-          </a:ln>
-        </p:spPr>
-        <p:txBody>
-          <a:bodyPr wrap="square" rtlCol="0" anchor="ctr" anchorCtr="1">
-            <a:spAutoFit/>
-          </a:bodyPr>
-          <a:lstStyle>
-            <a:defPPr>
-              <a:defRPr lang="nl-BE"/>
-            </a:defPPr>
-            <a:lvl1pPr algn="ctr">
-              <a:defRPr sz="2000">
-                <a:latin typeface="Times New Roman" pitchFamily="18" charset="0"/>
-                <a:cs typeface="Times New Roman" pitchFamily="18" charset="0"/>
-              </a:defRPr>
-            </a:lvl1pPr>
-          </a:lstStyle>
-          <a:p>
-            <a:r>
-              <a:rPr lang="nl-BE" dirty="0"/>
-              <a:t>Communicator</a:t>
-            </a:r>
-          </a:p>
-        </p:txBody>
-      </p:sp>
-      <p:sp>
-        <p:nvSpPr>
-          <p:cNvPr id="6" name="Tekstvak 5"/>
-          <p:cNvSpPr txBox="1">
-            <a:spLocks noChangeAspect="1"/>
-          </p:cNvSpPr>
-          <p:nvPr/>
-        </p:nvSpPr>
-        <p:spPr>
-          <a:xfrm>
-            <a:off x="4572000" y="3510880"/>
-            <a:ext cx="2338025" cy="400110"/>
-          </a:xfrm>
-          <a:prstGeom prst="rect">
-            <a:avLst/>
-          </a:prstGeom>
-          <a:noFill/>
-          <a:ln>
-            <a:solidFill>
-              <a:schemeClr val="tx1"/>
-            </a:solidFill>
-          </a:ln>
-        </p:spPr>
-        <p:txBody>
-          <a:bodyPr wrap="square" rtlCol="0" anchor="ctr" anchorCtr="1">
-            <a:spAutoFit/>
-          </a:bodyPr>
-          <a:lstStyle>
-            <a:defPPr>
-              <a:defRPr lang="nl-BE"/>
-            </a:defPPr>
-            <a:lvl1pPr algn="ctr">
-              <a:defRPr sz="2000">
-                <a:latin typeface="Times New Roman" pitchFamily="18" charset="0"/>
-                <a:cs typeface="Times New Roman" pitchFamily="18" charset="0"/>
-              </a:defRPr>
-            </a:lvl1pPr>
-          </a:lstStyle>
-          <a:p>
-            <a:r>
-              <a:rPr lang="nl-BE" dirty="0" err="1" smtClean="0"/>
-              <a:t>InfoRecieverThread</a:t>
-            </a:r>
-            <a:endParaRPr lang="nl-BE" dirty="0"/>
-          </a:p>
-        </p:txBody>
-      </p:sp>
-      <p:sp>
-        <p:nvSpPr>
-          <p:cNvPr id="7" name="Tekstvak 6"/>
-          <p:cNvSpPr txBox="1">
-            <a:spLocks noChangeAspect="1"/>
-          </p:cNvSpPr>
-          <p:nvPr/>
-        </p:nvSpPr>
-        <p:spPr>
-          <a:xfrm>
-            <a:off x="4572000" y="1779166"/>
-            <a:ext cx="2338025" cy="400110"/>
-          </a:xfrm>
-          <a:prstGeom prst="rect">
-            <a:avLst/>
-          </a:prstGeom>
-          <a:noFill/>
-          <a:ln>
-            <a:solidFill>
-              <a:schemeClr val="tx1"/>
-            </a:solidFill>
-          </a:ln>
-        </p:spPr>
-        <p:txBody>
-          <a:bodyPr wrap="square" rtlCol="0" anchor="ctr" anchorCtr="1">
-            <a:spAutoFit/>
-          </a:bodyPr>
-          <a:lstStyle/>
-          <a:p>
-            <a:pPr algn="ctr"/>
-            <a:r>
-              <a:rPr lang="nl-BE" sz="2000" dirty="0" err="1" smtClean="0">
-                <a:latin typeface="Times New Roman" pitchFamily="18" charset="0"/>
-                <a:cs typeface="Times New Roman" pitchFamily="18" charset="0"/>
-              </a:rPr>
-              <a:t>StatusInfoBuffer</a:t>
-            </a:r>
-            <a:endParaRPr lang="nl-BE" sz="2000" dirty="0">
-              <a:latin typeface="Times New Roman" pitchFamily="18" charset="0"/>
-              <a:cs typeface="Times New Roman" pitchFamily="18" charset="0"/>
-            </a:endParaRPr>
-          </a:p>
-        </p:txBody>
-      </p:sp>
-      <p:sp>
-        <p:nvSpPr>
-          <p:cNvPr id="12" name="Tekstvak 11"/>
-          <p:cNvSpPr txBox="1">
-            <a:spLocks noChangeAspect="1"/>
-          </p:cNvSpPr>
-          <p:nvPr/>
-        </p:nvSpPr>
-        <p:spPr>
-          <a:xfrm>
-            <a:off x="3635896" y="5321534"/>
-            <a:ext cx="1440000" cy="523220"/>
-          </a:xfrm>
-          <a:prstGeom prst="rect">
-            <a:avLst/>
-          </a:prstGeom>
-          <a:noFill/>
-          <a:ln>
-            <a:solidFill>
-              <a:schemeClr val="tx1"/>
-            </a:solidFill>
-          </a:ln>
-        </p:spPr>
-        <p:txBody>
-          <a:bodyPr wrap="square" rtlCol="0" anchor="ctr" anchorCtr="1">
-            <a:spAutoFit/>
-          </a:bodyPr>
-          <a:lstStyle>
-            <a:defPPr>
-              <a:defRPr lang="nl-BE"/>
-            </a:defPPr>
-            <a:lvl1pPr algn="ctr">
-              <a:defRPr sz="2000">
-                <a:latin typeface="Times New Roman" pitchFamily="18" charset="0"/>
-                <a:cs typeface="Times New Roman" pitchFamily="18" charset="0"/>
-              </a:defRPr>
-            </a:lvl1pPr>
-          </a:lstStyle>
-          <a:p>
-            <a:r>
-              <a:rPr lang="nl-BE" sz="2800" b="1" dirty="0" smtClean="0">
-                <a:solidFill>
-                  <a:srgbClr val="FF0000"/>
-                </a:solidFill>
-              </a:rPr>
-              <a:t>Robot</a:t>
-            </a:r>
-            <a:endParaRPr lang="nl-BE" b="1" dirty="0">
-              <a:solidFill>
-                <a:srgbClr val="FF0000"/>
-              </a:solidFill>
-            </a:endParaRPr>
-          </a:p>
-        </p:txBody>
-      </p:sp>
-      <p:cxnSp>
-        <p:nvCxnSpPr>
-          <p:cNvPr id="18" name="Rechte verbindingslijn met pijl 17"/>
-          <p:cNvCxnSpPr>
-            <a:stCxn id="4" idx="2"/>
-            <a:endCxn id="5" idx="0"/>
-          </p:cNvCxnSpPr>
-          <p:nvPr/>
-        </p:nvCxnSpPr>
-        <p:spPr>
-          <a:xfrm flipH="1">
-            <a:off x="2865569" y="2179276"/>
-            <a:ext cx="1" cy="1324584"/>
-          </a:xfrm>
-          <a:prstGeom prst="straightConnector1">
-            <a:avLst/>
-          </a:prstGeom>
-          <a:ln w="31750">
-            <a:headEnd w="lg" len="lg"/>
-            <a:tailEnd type="arrow" w="lg" len="lg"/>
-          </a:ln>
-        </p:spPr>
-        <p:style>
-          <a:lnRef idx="1">
-            <a:schemeClr val="accent1"/>
-          </a:lnRef>
-          <a:fillRef idx="0">
-            <a:schemeClr val="accent1"/>
-          </a:fillRef>
-          <a:effectRef idx="0">
-            <a:schemeClr val="accent1"/>
-          </a:effectRef>
-          <a:fontRef idx="minor">
-            <a:schemeClr val="tx1"/>
-          </a:fontRef>
-        </p:style>
-      </p:cxnSp>
-      <p:cxnSp>
-        <p:nvCxnSpPr>
-          <p:cNvPr id="22" name="Rechte verbindingslijn met pijl 21"/>
-          <p:cNvCxnSpPr>
-            <a:stCxn id="6" idx="0"/>
-            <a:endCxn id="7" idx="2"/>
-          </p:cNvCxnSpPr>
-          <p:nvPr/>
-        </p:nvCxnSpPr>
-        <p:spPr>
-          <a:xfrm flipV="1">
-            <a:off x="5741013" y="2179276"/>
-            <a:ext cx="0" cy="1331604"/>
-          </a:xfrm>
-          <a:prstGeom prst="straightConnector1">
-            <a:avLst/>
-          </a:prstGeom>
-          <a:ln w="31750">
-            <a:headEnd w="lg" len="lg"/>
-            <a:tailEnd type="arrow" w="lg" len="lg"/>
-          </a:ln>
-        </p:spPr>
-        <p:style>
-          <a:lnRef idx="1">
-            <a:schemeClr val="accent1"/>
-          </a:lnRef>
-          <a:fillRef idx="0">
-            <a:schemeClr val="accent1"/>
-          </a:fillRef>
-          <a:effectRef idx="0">
-            <a:schemeClr val="accent1"/>
-          </a:effectRef>
-          <a:fontRef idx="minor">
-            <a:schemeClr val="tx1"/>
-          </a:fontRef>
-        </p:style>
-      </p:cxnSp>
-      <p:cxnSp>
-        <p:nvCxnSpPr>
-          <p:cNvPr id="24" name="Rechte verbindingslijn met pijl 23"/>
-          <p:cNvCxnSpPr>
-            <a:stCxn id="7" idx="1"/>
-            <a:endCxn id="4" idx="3"/>
-          </p:cNvCxnSpPr>
-          <p:nvPr/>
-        </p:nvCxnSpPr>
-        <p:spPr>
-          <a:xfrm flipH="1">
-            <a:off x="4039459" y="1979221"/>
-            <a:ext cx="532541" cy="0"/>
-          </a:xfrm>
-          <a:prstGeom prst="straightConnector1">
-            <a:avLst/>
-          </a:prstGeom>
-          <a:ln w="31750">
-            <a:headEnd w="lg" len="lg"/>
-            <a:tailEnd type="arrow" w="lg" len="lg"/>
-          </a:ln>
-        </p:spPr>
-        <p:style>
-          <a:lnRef idx="1">
-            <a:schemeClr val="accent1"/>
-          </a:lnRef>
-          <a:fillRef idx="0">
-            <a:schemeClr val="accent1"/>
-          </a:fillRef>
-          <a:effectRef idx="0">
-            <a:schemeClr val="accent1"/>
-          </a:effectRef>
-          <a:fontRef idx="minor">
-            <a:schemeClr val="tx1"/>
-          </a:fontRef>
-        </p:style>
-      </p:cxnSp>
-      <p:cxnSp>
-        <p:nvCxnSpPr>
-          <p:cNvPr id="28" name="Rechte verbindingslijn met pijl 27"/>
-          <p:cNvCxnSpPr>
-            <a:stCxn id="5" idx="2"/>
-            <a:endCxn id="12" idx="0"/>
-          </p:cNvCxnSpPr>
-          <p:nvPr/>
-        </p:nvCxnSpPr>
-        <p:spPr>
-          <a:xfrm>
-            <a:off x="2865569" y="3903970"/>
-            <a:ext cx="1490327" cy="1417564"/>
-          </a:xfrm>
-          <a:prstGeom prst="straightConnector1">
-            <a:avLst/>
-          </a:prstGeom>
-          <a:ln w="31750">
-            <a:headEnd w="lg" len="lg"/>
-            <a:tailEnd type="arrow" w="lg" len="lg"/>
-          </a:ln>
-        </p:spPr>
-        <p:style>
-          <a:lnRef idx="1">
-            <a:schemeClr val="accent1"/>
-          </a:lnRef>
-          <a:fillRef idx="0">
-            <a:schemeClr val="accent1"/>
-          </a:fillRef>
-          <a:effectRef idx="0">
-            <a:schemeClr val="accent1"/>
-          </a:effectRef>
-          <a:fontRef idx="minor">
-            <a:schemeClr val="tx1"/>
-          </a:fontRef>
-        </p:style>
-      </p:cxnSp>
-      <p:cxnSp>
-        <p:nvCxnSpPr>
-          <p:cNvPr id="30" name="Rechte verbindingslijn met pijl 29"/>
-          <p:cNvCxnSpPr>
-            <a:stCxn id="12" idx="0"/>
-            <a:endCxn id="6" idx="2"/>
-          </p:cNvCxnSpPr>
-          <p:nvPr/>
-        </p:nvCxnSpPr>
-        <p:spPr>
-          <a:xfrm flipV="1">
-            <a:off x="4355896" y="3910990"/>
-            <a:ext cx="1385117" cy="1410544"/>
-          </a:xfrm>
-          <a:prstGeom prst="straightConnector1">
-            <a:avLst/>
-          </a:prstGeom>
-          <a:ln w="31750">
-            <a:headEnd w="lg" len="lg"/>
-            <a:tailEnd type="arrow" w="lg" len="lg"/>
-          </a:ln>
-        </p:spPr>
-        <p:style>
-          <a:lnRef idx="1">
-            <a:schemeClr val="accent1"/>
-          </a:lnRef>
-          <a:fillRef idx="0">
-            <a:schemeClr val="accent1"/>
-          </a:fillRef>
-          <a:effectRef idx="0">
-            <a:schemeClr val="accent1"/>
-          </a:effectRef>
-          <a:fontRef idx="minor">
-            <a:schemeClr val="tx1"/>
-          </a:fontRef>
-        </p:style>
-      </p:cxnSp>
-      <p:sp>
-        <p:nvSpPr>
-          <p:cNvPr id="31" name="Tekstvak 30"/>
-          <p:cNvSpPr txBox="1">
-            <a:spLocks noChangeAspect="1"/>
-          </p:cNvSpPr>
-          <p:nvPr/>
-        </p:nvSpPr>
-        <p:spPr>
-          <a:xfrm>
-            <a:off x="1691681" y="674192"/>
-            <a:ext cx="2347778" cy="400110"/>
-          </a:xfrm>
-          <a:prstGeom prst="rect">
-            <a:avLst/>
-          </a:prstGeom>
-          <a:noFill/>
-          <a:ln>
-            <a:solidFill>
-              <a:schemeClr val="tx1"/>
-            </a:solidFill>
-          </a:ln>
-        </p:spPr>
-        <p:txBody>
-          <a:bodyPr wrap="square" rtlCol="0" anchor="ctr" anchorCtr="1">
-            <a:spAutoFit/>
-          </a:bodyPr>
-          <a:lstStyle>
-            <a:defPPr>
-              <a:defRPr lang="nl-BE"/>
-            </a:defPPr>
-            <a:lvl1pPr algn="ctr">
-              <a:defRPr sz="2000">
-                <a:latin typeface="Times New Roman" pitchFamily="18" charset="0"/>
-                <a:cs typeface="Times New Roman" pitchFamily="18" charset="0"/>
-              </a:defRPr>
-            </a:lvl1pPr>
-          </a:lstStyle>
-          <a:p>
-            <a:r>
-              <a:rPr lang="nl-BE" dirty="0" smtClean="0"/>
-              <a:t>…</a:t>
-            </a:r>
-            <a:endParaRPr lang="nl-BE" dirty="0"/>
-          </a:p>
-        </p:txBody>
-      </p:sp>
-      <p:cxnSp>
-        <p:nvCxnSpPr>
-          <p:cNvPr id="33" name="Rechte verbindingslijn met pijl 32"/>
-          <p:cNvCxnSpPr>
-            <a:stCxn id="31" idx="2"/>
-            <a:endCxn id="4" idx="0"/>
-          </p:cNvCxnSpPr>
-          <p:nvPr/>
-        </p:nvCxnSpPr>
-        <p:spPr>
-          <a:xfrm>
-            <a:off x="2865570" y="1074302"/>
-            <a:ext cx="0" cy="704864"/>
-          </a:xfrm>
-          <a:prstGeom prst="straightConnector1">
-            <a:avLst/>
-          </a:prstGeom>
-          <a:ln w="31750">
-            <a:headEnd w="lg" len="lg"/>
-            <a:tailEnd type="arrow" w="lg" len="lg"/>
-          </a:ln>
-        </p:spPr>
-        <p:style>
-          <a:lnRef idx="1">
-            <a:schemeClr val="accent1"/>
-          </a:lnRef>
-          <a:fillRef idx="0">
-            <a:schemeClr val="accent1"/>
-          </a:fillRef>
-          <a:effectRef idx="0">
-            <a:schemeClr val="accent1"/>
-          </a:effectRef>
-          <a:fontRef idx="minor">
-            <a:schemeClr val="tx1"/>
-          </a:fontRef>
-        </p:style>
-      </p:cxnSp>
       <p:grpSp>
         <p:nvGrpSpPr>
-          <p:cNvPr id="38" name="Groep 37"/>
+          <p:cNvPr id="9" name="Groep 8"/>
           <p:cNvGrpSpPr/>
           <p:nvPr/>
         </p:nvGrpSpPr>
         <p:grpSpPr>
           <a:xfrm>
-            <a:off x="5174551" y="674192"/>
-            <a:ext cx="1735474" cy="276999"/>
-            <a:chOff x="6110655" y="5044534"/>
-            <a:chExt cx="1735474" cy="276999"/>
+            <a:off x="1691679" y="674192"/>
+            <a:ext cx="5218346" cy="5170562"/>
+            <a:chOff x="1691679" y="674192"/>
+            <a:chExt cx="5218346" cy="5170562"/>
           </a:xfrm>
         </p:grpSpPr>
-        <p:cxnSp>
-          <p:nvCxnSpPr>
-            <p:cNvPr id="34" name="Rechte verbindingslijn met pijl 33"/>
-            <p:cNvCxnSpPr/>
+        <p:grpSp>
+          <p:nvGrpSpPr>
+            <p:cNvPr id="8" name="Groep 7"/>
+            <p:cNvGrpSpPr/>
             <p:nvPr/>
-          </p:nvCxnSpPr>
-          <p:spPr>
+          </p:nvGrpSpPr>
+          <p:grpSpPr>
             <a:xfrm>
-              <a:off x="6110655" y="5187672"/>
-              <a:ext cx="470514" cy="0"/>
+              <a:off x="1691679" y="674192"/>
+              <a:ext cx="5218346" cy="5170562"/>
+              <a:chOff x="1691679" y="674192"/>
+              <a:chExt cx="5218346" cy="5170562"/>
             </a:xfrm>
-            <a:prstGeom prst="straightConnector1">
-              <a:avLst/>
-            </a:prstGeom>
-            <a:ln w="31750">
-              <a:headEnd w="lg" len="lg"/>
-              <a:tailEnd type="arrow" w="lg" len="lg"/>
-            </a:ln>
-          </p:spPr>
-          <p:style>
-            <a:lnRef idx="1">
-              <a:schemeClr val="accent1"/>
-            </a:lnRef>
-            <a:fillRef idx="0">
-              <a:schemeClr val="accent1"/>
-            </a:fillRef>
-            <a:effectRef idx="0">
-              <a:schemeClr val="accent1"/>
-            </a:effectRef>
-            <a:fontRef idx="minor">
-              <a:schemeClr val="tx1"/>
-            </a:fontRef>
-          </p:style>
-        </p:cxnSp>
-        <p:sp>
-          <p:nvSpPr>
-            <p:cNvPr id="36" name="Tekstvak 35"/>
-            <p:cNvSpPr txBox="1">
-              <a:spLocks noChangeAspect="1"/>
-            </p:cNvSpPr>
-            <p:nvPr/>
-          </p:nvSpPr>
-          <p:spPr>
-            <a:xfrm>
-              <a:off x="6588224" y="5044534"/>
-              <a:ext cx="1257905" cy="276999"/>
-            </a:xfrm>
-            <a:prstGeom prst="rect">
-              <a:avLst/>
-            </a:prstGeom>
-            <a:noFill/>
-            <a:ln>
+          </p:grpSpPr>
+          <p:sp>
+            <p:nvSpPr>
+              <p:cNvPr id="4" name="Tekstvak 3"/>
+              <p:cNvSpPr txBox="1">
+                <a:spLocks noChangeAspect="1"/>
+              </p:cNvSpPr>
+              <p:nvPr/>
+            </p:nvSpPr>
+            <p:spPr>
+              <a:xfrm>
+                <a:off x="1691680" y="1779166"/>
+                <a:ext cx="2347779" cy="400110"/>
+              </a:xfrm>
+              <a:prstGeom prst="rect">
+                <a:avLst/>
+              </a:prstGeom>
               <a:noFill/>
-            </a:ln>
-          </p:spPr>
-          <p:txBody>
-            <a:bodyPr wrap="square" rtlCol="0" anchor="b" anchorCtr="0">
-              <a:spAutoFit/>
-            </a:bodyPr>
-            <a:lstStyle>
-              <a:defPPr>
-                <a:defRPr lang="nl-BE"/>
-              </a:defPPr>
-              <a:lvl1pPr algn="ctr">
-                <a:defRPr sz="2000">
+              <a:ln>
+                <a:solidFill>
+                  <a:schemeClr val="tx1"/>
+                </a:solidFill>
+              </a:ln>
+            </p:spPr>
+            <p:txBody>
+              <a:bodyPr wrap="square" rtlCol="0" anchor="ctr" anchorCtr="1">
+                <a:spAutoFit/>
+              </a:bodyPr>
+              <a:lstStyle>
+                <a:defPPr>
+                  <a:defRPr lang="nl-BE"/>
+                </a:defPPr>
+                <a:lvl1pPr algn="ctr">
+                  <a:defRPr sz="2000">
+                    <a:latin typeface="Times New Roman" pitchFamily="18" charset="0"/>
+                    <a:cs typeface="Times New Roman" pitchFamily="18" charset="0"/>
+                  </a:defRPr>
+                </a:lvl1pPr>
+              </a:lstStyle>
+              <a:p>
+                <a:r>
+                  <a:rPr lang="nl-BE" dirty="0" err="1"/>
+                  <a:t>RobotPilot</a:t>
+                </a:r>
+                <a:endParaRPr lang="nl-BE" dirty="0"/>
+              </a:p>
+            </p:txBody>
+          </p:sp>
+          <p:sp>
+            <p:nvSpPr>
+              <p:cNvPr id="5" name="Tekstvak 4"/>
+              <p:cNvSpPr txBox="1">
+                <a:spLocks noChangeAspect="1"/>
+              </p:cNvSpPr>
+              <p:nvPr/>
+            </p:nvSpPr>
+            <p:spPr>
+              <a:xfrm>
+                <a:off x="1691679" y="3503860"/>
+                <a:ext cx="2347780" cy="400110"/>
+              </a:xfrm>
+              <a:prstGeom prst="rect">
+                <a:avLst/>
+              </a:prstGeom>
+              <a:noFill/>
+              <a:ln>
+                <a:solidFill>
+                  <a:schemeClr val="tx1"/>
+                </a:solidFill>
+              </a:ln>
+            </p:spPr>
+            <p:txBody>
+              <a:bodyPr wrap="square" rtlCol="0" anchor="ctr" anchorCtr="1">
+                <a:spAutoFit/>
+              </a:bodyPr>
+              <a:lstStyle>
+                <a:defPPr>
+                  <a:defRPr lang="nl-BE"/>
+                </a:defPPr>
+                <a:lvl1pPr algn="ctr">
+                  <a:defRPr sz="2000">
+                    <a:latin typeface="Times New Roman" pitchFamily="18" charset="0"/>
+                    <a:cs typeface="Times New Roman" pitchFamily="18" charset="0"/>
+                  </a:defRPr>
+                </a:lvl1pPr>
+              </a:lstStyle>
+              <a:p>
+                <a:r>
+                  <a:rPr lang="nl-BE" dirty="0"/>
+                  <a:t>Communicator</a:t>
+                </a:r>
+              </a:p>
+            </p:txBody>
+          </p:sp>
+          <p:sp>
+            <p:nvSpPr>
+              <p:cNvPr id="6" name="Tekstvak 5"/>
+              <p:cNvSpPr txBox="1">
+                <a:spLocks noChangeAspect="1"/>
+              </p:cNvSpPr>
+              <p:nvPr/>
+            </p:nvSpPr>
+            <p:spPr>
+              <a:xfrm>
+                <a:off x="4572000" y="3510880"/>
+                <a:ext cx="2338025" cy="400110"/>
+              </a:xfrm>
+              <a:prstGeom prst="rect">
+                <a:avLst/>
+              </a:prstGeom>
+              <a:noFill/>
+              <a:ln>
+                <a:solidFill>
+                  <a:schemeClr val="tx1"/>
+                </a:solidFill>
+              </a:ln>
+            </p:spPr>
+            <p:txBody>
+              <a:bodyPr wrap="square" rtlCol="0" anchor="ctr" anchorCtr="1">
+                <a:spAutoFit/>
+              </a:bodyPr>
+              <a:lstStyle>
+                <a:defPPr>
+                  <a:defRPr lang="nl-BE"/>
+                </a:defPPr>
+                <a:lvl1pPr algn="ctr">
+                  <a:defRPr sz="2000">
+                    <a:latin typeface="Times New Roman" pitchFamily="18" charset="0"/>
+                    <a:cs typeface="Times New Roman" pitchFamily="18" charset="0"/>
+                  </a:defRPr>
+                </a:lvl1pPr>
+              </a:lstStyle>
+              <a:p>
+                <a:r>
+                  <a:rPr lang="nl-BE" dirty="0" err="1" smtClean="0"/>
+                  <a:t>InfoRecieverThread</a:t>
+                </a:r>
+                <a:endParaRPr lang="nl-BE" dirty="0"/>
+              </a:p>
+            </p:txBody>
+          </p:sp>
+          <p:sp>
+            <p:nvSpPr>
+              <p:cNvPr id="7" name="Tekstvak 6"/>
+              <p:cNvSpPr txBox="1">
+                <a:spLocks noChangeAspect="1"/>
+              </p:cNvSpPr>
+              <p:nvPr/>
+            </p:nvSpPr>
+            <p:spPr>
+              <a:xfrm>
+                <a:off x="4572000" y="1779166"/>
+                <a:ext cx="2338025" cy="400110"/>
+              </a:xfrm>
+              <a:prstGeom prst="rect">
+                <a:avLst/>
+              </a:prstGeom>
+              <a:noFill/>
+              <a:ln>
+                <a:solidFill>
+                  <a:schemeClr val="tx1"/>
+                </a:solidFill>
+              </a:ln>
+            </p:spPr>
+            <p:txBody>
+              <a:bodyPr wrap="square" rtlCol="0" anchor="ctr" anchorCtr="1">
+                <a:spAutoFit/>
+              </a:bodyPr>
+              <a:lstStyle/>
+              <a:p>
+                <a:pPr algn="ctr"/>
+                <a:r>
+                  <a:rPr lang="nl-BE" sz="2000" dirty="0" err="1" smtClean="0">
+                    <a:latin typeface="Times New Roman" pitchFamily="18" charset="0"/>
+                    <a:cs typeface="Times New Roman" pitchFamily="18" charset="0"/>
+                  </a:rPr>
+                  <a:t>StatusInfoBuffer</a:t>
+                </a:r>
+                <a:endParaRPr lang="nl-BE" sz="2000" dirty="0">
                   <a:latin typeface="Times New Roman" pitchFamily="18" charset="0"/>
                   <a:cs typeface="Times New Roman" pitchFamily="18" charset="0"/>
-                </a:defRPr>
-              </a:lvl1pPr>
-            </a:lstStyle>
-            <a:p>
-              <a:pPr algn="r"/>
-              <a:r>
-                <a:rPr lang="nl-BE" sz="1200" dirty="0" smtClean="0"/>
-                <a:t>informatiestroom</a:t>
-              </a:r>
-              <a:endParaRPr lang="nl-BE" sz="1200" dirty="0"/>
-            </a:p>
-          </p:txBody>
-        </p:sp>
+                </a:endParaRPr>
+              </a:p>
+            </p:txBody>
+          </p:sp>
+          <p:sp>
+            <p:nvSpPr>
+              <p:cNvPr id="12" name="Tekstvak 11"/>
+              <p:cNvSpPr txBox="1">
+                <a:spLocks noChangeAspect="1"/>
+              </p:cNvSpPr>
+              <p:nvPr/>
+            </p:nvSpPr>
+            <p:spPr>
+              <a:xfrm>
+                <a:off x="3635896" y="5321534"/>
+                <a:ext cx="1440000" cy="523220"/>
+              </a:xfrm>
+              <a:prstGeom prst="rect">
+                <a:avLst/>
+              </a:prstGeom>
+              <a:noFill/>
+              <a:ln>
+                <a:solidFill>
+                  <a:schemeClr val="tx1"/>
+                </a:solidFill>
+              </a:ln>
+            </p:spPr>
+            <p:txBody>
+              <a:bodyPr wrap="square" rtlCol="0" anchor="ctr" anchorCtr="1">
+                <a:spAutoFit/>
+              </a:bodyPr>
+              <a:lstStyle>
+                <a:defPPr>
+                  <a:defRPr lang="nl-BE"/>
+                </a:defPPr>
+                <a:lvl1pPr algn="ctr">
+                  <a:defRPr sz="2000">
+                    <a:latin typeface="Times New Roman" pitchFamily="18" charset="0"/>
+                    <a:cs typeface="Times New Roman" pitchFamily="18" charset="0"/>
+                  </a:defRPr>
+                </a:lvl1pPr>
+              </a:lstStyle>
+              <a:p>
+                <a:r>
+                  <a:rPr lang="nl-BE" sz="2800" b="1" dirty="0" smtClean="0">
+                    <a:solidFill>
+                      <a:srgbClr val="FF0000"/>
+                    </a:solidFill>
+                  </a:rPr>
+                  <a:t>Robot</a:t>
+                </a:r>
+                <a:endParaRPr lang="nl-BE" b="1" dirty="0">
+                  <a:solidFill>
+                    <a:srgbClr val="FF0000"/>
+                  </a:solidFill>
+                </a:endParaRPr>
+              </a:p>
+            </p:txBody>
+          </p:sp>
+          <p:sp>
+            <p:nvSpPr>
+              <p:cNvPr id="31" name="Tekstvak 30"/>
+              <p:cNvSpPr txBox="1">
+                <a:spLocks noChangeAspect="1"/>
+              </p:cNvSpPr>
+              <p:nvPr/>
+            </p:nvSpPr>
+            <p:spPr>
+              <a:xfrm>
+                <a:off x="1691681" y="674192"/>
+                <a:ext cx="2347778" cy="400110"/>
+              </a:xfrm>
+              <a:prstGeom prst="rect">
+                <a:avLst/>
+              </a:prstGeom>
+              <a:noFill/>
+              <a:ln>
+                <a:solidFill>
+                  <a:schemeClr val="tx1"/>
+                </a:solidFill>
+              </a:ln>
+            </p:spPr>
+            <p:txBody>
+              <a:bodyPr wrap="square" rtlCol="0" anchor="ctr" anchorCtr="1">
+                <a:spAutoFit/>
+              </a:bodyPr>
+              <a:lstStyle>
+                <a:defPPr>
+                  <a:defRPr lang="nl-BE"/>
+                </a:defPPr>
+                <a:lvl1pPr algn="ctr">
+                  <a:defRPr sz="2000">
+                    <a:latin typeface="Times New Roman" pitchFamily="18" charset="0"/>
+                    <a:cs typeface="Times New Roman" pitchFamily="18" charset="0"/>
+                  </a:defRPr>
+                </a:lvl1pPr>
+              </a:lstStyle>
+              <a:p>
+                <a:r>
+                  <a:rPr lang="nl-BE" dirty="0" smtClean="0"/>
+                  <a:t>…</a:t>
+                </a:r>
+                <a:endParaRPr lang="nl-BE" dirty="0"/>
+              </a:p>
+            </p:txBody>
+          </p:sp>
+        </p:grpSp>
+        <p:grpSp>
+          <p:nvGrpSpPr>
+            <p:cNvPr id="3" name="Groep 2"/>
+            <p:cNvGrpSpPr/>
+            <p:nvPr/>
+          </p:nvGrpSpPr>
+          <p:grpSpPr>
+            <a:xfrm>
+              <a:off x="2865569" y="1074302"/>
+              <a:ext cx="2875444" cy="4247232"/>
+              <a:chOff x="2865569" y="1074302"/>
+              <a:chExt cx="2875444" cy="4247232"/>
+            </a:xfrm>
+          </p:grpSpPr>
+          <p:cxnSp>
+            <p:nvCxnSpPr>
+              <p:cNvPr id="18" name="Rechte verbindingslijn met pijl 17"/>
+              <p:cNvCxnSpPr>
+                <a:stCxn id="4" idx="2"/>
+                <a:endCxn id="5" idx="0"/>
+              </p:cNvCxnSpPr>
+              <p:nvPr/>
+            </p:nvCxnSpPr>
+            <p:spPr>
+              <a:xfrm flipH="1">
+                <a:off x="2865569" y="2179276"/>
+                <a:ext cx="1" cy="1324584"/>
+              </a:xfrm>
+              <a:prstGeom prst="straightConnector1">
+                <a:avLst/>
+              </a:prstGeom>
+              <a:ln w="31750">
+                <a:headEnd w="lg" len="lg"/>
+                <a:tailEnd type="arrow" w="lg" len="lg"/>
+              </a:ln>
+            </p:spPr>
+            <p:style>
+              <a:lnRef idx="1">
+                <a:schemeClr val="accent1"/>
+              </a:lnRef>
+              <a:fillRef idx="0">
+                <a:schemeClr val="accent1"/>
+              </a:fillRef>
+              <a:effectRef idx="0">
+                <a:schemeClr val="accent1"/>
+              </a:effectRef>
+              <a:fontRef idx="minor">
+                <a:schemeClr val="tx1"/>
+              </a:fontRef>
+            </p:style>
+          </p:cxnSp>
+          <p:cxnSp>
+            <p:nvCxnSpPr>
+              <p:cNvPr id="22" name="Rechte verbindingslijn met pijl 21"/>
+              <p:cNvCxnSpPr>
+                <a:stCxn id="6" idx="0"/>
+                <a:endCxn id="7" idx="2"/>
+              </p:cNvCxnSpPr>
+              <p:nvPr/>
+            </p:nvCxnSpPr>
+            <p:spPr>
+              <a:xfrm flipV="1">
+                <a:off x="5741013" y="2179276"/>
+                <a:ext cx="0" cy="1331604"/>
+              </a:xfrm>
+              <a:prstGeom prst="straightConnector1">
+                <a:avLst/>
+              </a:prstGeom>
+              <a:ln w="31750">
+                <a:headEnd w="lg" len="lg"/>
+                <a:tailEnd type="arrow" w="lg" len="lg"/>
+              </a:ln>
+            </p:spPr>
+            <p:style>
+              <a:lnRef idx="1">
+                <a:schemeClr val="accent1"/>
+              </a:lnRef>
+              <a:fillRef idx="0">
+                <a:schemeClr val="accent1"/>
+              </a:fillRef>
+              <a:effectRef idx="0">
+                <a:schemeClr val="accent1"/>
+              </a:effectRef>
+              <a:fontRef idx="minor">
+                <a:schemeClr val="tx1"/>
+              </a:fontRef>
+            </p:style>
+          </p:cxnSp>
+          <p:cxnSp>
+            <p:nvCxnSpPr>
+              <p:cNvPr id="24" name="Rechte verbindingslijn met pijl 23"/>
+              <p:cNvCxnSpPr>
+                <a:stCxn id="7" idx="1"/>
+                <a:endCxn id="4" idx="3"/>
+              </p:cNvCxnSpPr>
+              <p:nvPr/>
+            </p:nvCxnSpPr>
+            <p:spPr>
+              <a:xfrm flipH="1">
+                <a:off x="4039459" y="1979221"/>
+                <a:ext cx="532541" cy="0"/>
+              </a:xfrm>
+              <a:prstGeom prst="straightConnector1">
+                <a:avLst/>
+              </a:prstGeom>
+              <a:ln w="31750">
+                <a:headEnd w="lg" len="lg"/>
+                <a:tailEnd type="arrow" w="lg" len="lg"/>
+              </a:ln>
+            </p:spPr>
+            <p:style>
+              <a:lnRef idx="1">
+                <a:schemeClr val="accent1"/>
+              </a:lnRef>
+              <a:fillRef idx="0">
+                <a:schemeClr val="accent1"/>
+              </a:fillRef>
+              <a:effectRef idx="0">
+                <a:schemeClr val="accent1"/>
+              </a:effectRef>
+              <a:fontRef idx="minor">
+                <a:schemeClr val="tx1"/>
+              </a:fontRef>
+            </p:style>
+          </p:cxnSp>
+          <p:cxnSp>
+            <p:nvCxnSpPr>
+              <p:cNvPr id="28" name="Rechte verbindingslijn met pijl 27"/>
+              <p:cNvCxnSpPr>
+                <a:stCxn id="5" idx="2"/>
+                <a:endCxn id="12" idx="0"/>
+              </p:cNvCxnSpPr>
+              <p:nvPr/>
+            </p:nvCxnSpPr>
+            <p:spPr>
+              <a:xfrm>
+                <a:off x="2865569" y="3903970"/>
+                <a:ext cx="1490327" cy="1417564"/>
+              </a:xfrm>
+              <a:prstGeom prst="straightConnector1">
+                <a:avLst/>
+              </a:prstGeom>
+              <a:ln w="31750">
+                <a:headEnd w="lg" len="lg"/>
+                <a:tailEnd type="arrow" w="lg" len="lg"/>
+              </a:ln>
+            </p:spPr>
+            <p:style>
+              <a:lnRef idx="1">
+                <a:schemeClr val="accent1"/>
+              </a:lnRef>
+              <a:fillRef idx="0">
+                <a:schemeClr val="accent1"/>
+              </a:fillRef>
+              <a:effectRef idx="0">
+                <a:schemeClr val="accent1"/>
+              </a:effectRef>
+              <a:fontRef idx="minor">
+                <a:schemeClr val="tx1"/>
+              </a:fontRef>
+            </p:style>
+          </p:cxnSp>
+          <p:cxnSp>
+            <p:nvCxnSpPr>
+              <p:cNvPr id="30" name="Rechte verbindingslijn met pijl 29"/>
+              <p:cNvCxnSpPr>
+                <a:stCxn id="12" idx="0"/>
+                <a:endCxn id="6" idx="2"/>
+              </p:cNvCxnSpPr>
+              <p:nvPr/>
+            </p:nvCxnSpPr>
+            <p:spPr>
+              <a:xfrm flipV="1">
+                <a:off x="4355896" y="3910990"/>
+                <a:ext cx="1385117" cy="1410544"/>
+              </a:xfrm>
+              <a:prstGeom prst="straightConnector1">
+                <a:avLst/>
+              </a:prstGeom>
+              <a:ln w="31750">
+                <a:headEnd w="lg" len="lg"/>
+                <a:tailEnd type="arrow" w="lg" len="lg"/>
+              </a:ln>
+            </p:spPr>
+            <p:style>
+              <a:lnRef idx="1">
+                <a:schemeClr val="accent1"/>
+              </a:lnRef>
+              <a:fillRef idx="0">
+                <a:schemeClr val="accent1"/>
+              </a:fillRef>
+              <a:effectRef idx="0">
+                <a:schemeClr val="accent1"/>
+              </a:effectRef>
+              <a:fontRef idx="minor">
+                <a:schemeClr val="tx1"/>
+              </a:fontRef>
+            </p:style>
+          </p:cxnSp>
+          <p:cxnSp>
+            <p:nvCxnSpPr>
+              <p:cNvPr id="33" name="Rechte verbindingslijn met pijl 32"/>
+              <p:cNvCxnSpPr>
+                <a:stCxn id="31" idx="2"/>
+                <a:endCxn id="4" idx="0"/>
+              </p:cNvCxnSpPr>
+              <p:nvPr/>
+            </p:nvCxnSpPr>
+            <p:spPr>
+              <a:xfrm>
+                <a:off x="2865570" y="1074302"/>
+                <a:ext cx="0" cy="704864"/>
+              </a:xfrm>
+              <a:prstGeom prst="straightConnector1">
+                <a:avLst/>
+              </a:prstGeom>
+              <a:ln w="31750">
+                <a:headEnd w="lg" len="lg"/>
+                <a:tailEnd type="arrow" w="lg" len="lg"/>
+              </a:ln>
+            </p:spPr>
+            <p:style>
+              <a:lnRef idx="1">
+                <a:schemeClr val="accent1"/>
+              </a:lnRef>
+              <a:fillRef idx="0">
+                <a:schemeClr val="accent1"/>
+              </a:fillRef>
+              <a:effectRef idx="0">
+                <a:schemeClr val="accent1"/>
+              </a:effectRef>
+              <a:fontRef idx="minor">
+                <a:schemeClr val="tx1"/>
+              </a:fontRef>
+            </p:style>
+          </p:cxnSp>
+        </p:grpSp>
       </p:grpSp>
     </p:spTree>
     <p:extLst>
       <p:ext uri="{BB962C8B-B14F-4D97-AF65-F5344CB8AC3E}">
         <p14:creationId xmlns:p14="http://schemas.microsoft.com/office/powerpoint/2010/main" val="3186441246"/>
+      </p:ext>
+    </p:extLst>
+  </p:cSld>
+  <p:clrMapOvr>
+    <a:masterClrMapping/>
+  </p:clrMapOvr>
+</p:sld>
+</file>
+
+<file path=ppt/slides/slide4.xml><?xml version="1.0" encoding="utf-8"?>
+<p:sld xmlns:a="http://schemas.openxmlformats.org/drawingml/2006/main" xmlns:r="http://schemas.openxmlformats.org/officeDocument/2006/relationships" xmlns:p="http://schemas.openxmlformats.org/presentationml/2006/main">
+  <p:cSld>
+    <p:spTree>
+      <p:nvGrpSpPr>
+        <p:cNvPr id="1" name=""/>
+        <p:cNvGrpSpPr/>
+        <p:nvPr/>
+      </p:nvGrpSpPr>
+      <p:grpSpPr>
+        <a:xfrm>
+          <a:off x="0" y="0"/>
+          <a:ext cx="0" cy="0"/>
+          <a:chOff x="0" y="0"/>
+          <a:chExt cx="0" cy="0"/>
+        </a:xfrm>
+      </p:grpSpPr>
+      <p:grpSp>
+        <p:nvGrpSpPr>
+          <p:cNvPr id="4" name="Groep 3"/>
+          <p:cNvGrpSpPr/>
+          <p:nvPr/>
+        </p:nvGrpSpPr>
+        <p:grpSpPr>
+          <a:xfrm>
+            <a:off x="1678622" y="2090875"/>
+            <a:ext cx="3181411" cy="1050093"/>
+            <a:chOff x="169535" y="116281"/>
+            <a:chExt cx="1817761" cy="591578"/>
+          </a:xfrm>
+        </p:grpSpPr>
+        <p:grpSp>
+          <p:nvGrpSpPr>
+            <p:cNvPr id="5" name="Groep 4"/>
+            <p:cNvGrpSpPr/>
+            <p:nvPr/>
+          </p:nvGrpSpPr>
+          <p:grpSpPr>
+            <a:xfrm>
+              <a:off x="169535" y="447777"/>
+              <a:ext cx="1584176" cy="260082"/>
+              <a:chOff x="169535" y="447777"/>
+              <a:chExt cx="1584176" cy="260082"/>
+            </a:xfrm>
+          </p:grpSpPr>
+          <p:cxnSp>
+            <p:nvCxnSpPr>
+              <p:cNvPr id="9" name="Rechte verbindingslijn met pijl 8"/>
+              <p:cNvCxnSpPr/>
+              <p:nvPr/>
+            </p:nvCxnSpPr>
+            <p:spPr>
+              <a:xfrm>
+                <a:off x="169535" y="573998"/>
+                <a:ext cx="470514" cy="0"/>
+              </a:xfrm>
+              <a:prstGeom prst="straightConnector1">
+                <a:avLst/>
+              </a:prstGeom>
+              <a:ln w="31750">
+                <a:solidFill>
+                  <a:srgbClr val="96329E"/>
+                </a:solidFill>
+                <a:headEnd w="lg" len="lg"/>
+                <a:tailEnd type="arrow" w="lg" len="lg"/>
+              </a:ln>
+            </p:spPr>
+            <p:style>
+              <a:lnRef idx="1">
+                <a:schemeClr val="accent1"/>
+              </a:lnRef>
+              <a:fillRef idx="0">
+                <a:schemeClr val="accent1"/>
+              </a:fillRef>
+              <a:effectRef idx="0">
+                <a:schemeClr val="accent1"/>
+              </a:effectRef>
+              <a:fontRef idx="minor">
+                <a:schemeClr val="tx1"/>
+              </a:fontRef>
+            </p:style>
+          </p:cxnSp>
+          <p:sp>
+            <p:nvSpPr>
+              <p:cNvPr id="10" name="Tekstvak 9"/>
+              <p:cNvSpPr txBox="1">
+                <a:spLocks noChangeAspect="1"/>
+              </p:cNvSpPr>
+              <p:nvPr/>
+            </p:nvSpPr>
+            <p:spPr>
+              <a:xfrm>
+                <a:off x="647104" y="447777"/>
+                <a:ext cx="1106607" cy="260082"/>
+              </a:xfrm>
+              <a:prstGeom prst="rect">
+                <a:avLst/>
+              </a:prstGeom>
+              <a:noFill/>
+              <a:ln>
+                <a:noFill/>
+              </a:ln>
+            </p:spPr>
+            <p:txBody>
+              <a:bodyPr wrap="square" rtlCol="0" anchor="b" anchorCtr="0">
+                <a:spAutoFit/>
+              </a:bodyPr>
+              <a:lstStyle>
+                <a:defPPr>
+                  <a:defRPr lang="nl-BE"/>
+                </a:defPPr>
+                <a:lvl1pPr algn="ctr">
+                  <a:defRPr sz="2000">
+                    <a:latin typeface="Times New Roman" pitchFamily="18" charset="0"/>
+                    <a:cs typeface="Times New Roman" pitchFamily="18" charset="0"/>
+                  </a:defRPr>
+                </a:lvl1pPr>
+              </a:lstStyle>
+              <a:p>
+                <a:pPr algn="l"/>
+                <a:r>
+                  <a:rPr lang="nl-BE" sz="2400" dirty="0"/>
+                  <a:t>erft over van</a:t>
+                </a:r>
+              </a:p>
+            </p:txBody>
+          </p:sp>
+        </p:grpSp>
+        <p:grpSp>
+          <p:nvGrpSpPr>
+            <p:cNvPr id="6" name="Groep 5"/>
+            <p:cNvGrpSpPr/>
+            <p:nvPr/>
+          </p:nvGrpSpPr>
+          <p:grpSpPr>
+            <a:xfrm>
+              <a:off x="169535" y="116281"/>
+              <a:ext cx="1817761" cy="260083"/>
+              <a:chOff x="6110655" y="5061450"/>
+              <a:chExt cx="1817761" cy="260083"/>
+            </a:xfrm>
+          </p:grpSpPr>
+          <p:cxnSp>
+            <p:nvCxnSpPr>
+              <p:cNvPr id="7" name="Rechte verbindingslijn met pijl 6"/>
+              <p:cNvCxnSpPr/>
+              <p:nvPr/>
+            </p:nvCxnSpPr>
+            <p:spPr>
+              <a:xfrm>
+                <a:off x="6110655" y="5187672"/>
+                <a:ext cx="470514" cy="0"/>
+              </a:xfrm>
+              <a:prstGeom prst="straightConnector1">
+                <a:avLst/>
+              </a:prstGeom>
+              <a:ln w="31750">
+                <a:headEnd w="lg" len="lg"/>
+                <a:tailEnd type="arrow" w="lg" len="lg"/>
+              </a:ln>
+            </p:spPr>
+            <p:style>
+              <a:lnRef idx="1">
+                <a:schemeClr val="accent1"/>
+              </a:lnRef>
+              <a:fillRef idx="0">
+                <a:schemeClr val="accent1"/>
+              </a:fillRef>
+              <a:effectRef idx="0">
+                <a:schemeClr val="accent1"/>
+              </a:effectRef>
+              <a:fontRef idx="minor">
+                <a:schemeClr val="tx1"/>
+              </a:fontRef>
+            </p:style>
+          </p:cxnSp>
+          <p:sp>
+            <p:nvSpPr>
+              <p:cNvPr id="8" name="Tekstvak 7"/>
+              <p:cNvSpPr txBox="1">
+                <a:spLocks noChangeAspect="1"/>
+              </p:cNvSpPr>
+              <p:nvPr/>
+            </p:nvSpPr>
+            <p:spPr>
+              <a:xfrm>
+                <a:off x="6588224" y="5061450"/>
+                <a:ext cx="1340192" cy="260083"/>
+              </a:xfrm>
+              <a:prstGeom prst="rect">
+                <a:avLst/>
+              </a:prstGeom>
+              <a:noFill/>
+              <a:ln>
+                <a:noFill/>
+              </a:ln>
+            </p:spPr>
+            <p:txBody>
+              <a:bodyPr wrap="square" rtlCol="0" anchor="b" anchorCtr="0">
+                <a:spAutoFit/>
+              </a:bodyPr>
+              <a:lstStyle>
+                <a:defPPr>
+                  <a:defRPr lang="nl-BE"/>
+                </a:defPPr>
+                <a:lvl1pPr algn="ctr">
+                  <a:defRPr sz="2000">
+                    <a:latin typeface="Times New Roman" pitchFamily="18" charset="0"/>
+                    <a:cs typeface="Times New Roman" pitchFamily="18" charset="0"/>
+                  </a:defRPr>
+                </a:lvl1pPr>
+              </a:lstStyle>
+              <a:p>
+                <a:pPr algn="l"/>
+                <a:r>
+                  <a:rPr lang="nl-BE" sz="2400" dirty="0" smtClean="0"/>
+                  <a:t>informatiestroom</a:t>
+                </a:r>
+                <a:endParaRPr lang="nl-BE" sz="1200" dirty="0"/>
+              </a:p>
+            </p:txBody>
+          </p:sp>
+        </p:grpSp>
+      </p:grpSp>
+    </p:spTree>
+    <p:extLst>
+      <p:ext uri="{BB962C8B-B14F-4D97-AF65-F5344CB8AC3E}">
+        <p14:creationId xmlns:p14="http://schemas.microsoft.com/office/powerpoint/2010/main" val="1890845119"/>
       </p:ext>
     </p:extLst>
   </p:cSld>

</xml_diff>